<commit_message>
feat: add new usb datasheet
</commit_message>
<xml_diff>
--- a/Projects/CameraSystem/Docs/Block_Diagram.pptx
+++ b/Projects/CameraSystem/Docs/Block_Diagram.pptx
@@ -240,7 +240,7 @@
             <a:fld id="{B1816B0C-7247-44DD-BCB7-DAF5E546C78B}" type="datetimeFigureOut">
               <a:rPr lang="de-DE" smtClean="0"/>
               <a:pPr/>
-              <a:t>17.09.2018</a:t>
+              <a:t>30.09.2018</a:t>
             </a:fld>
             <a:endParaRPr lang="de-DE"/>
           </a:p>
@@ -412,7 +412,7 @@
             <a:fld id="{B1816B0C-7247-44DD-BCB7-DAF5E546C78B}" type="datetimeFigureOut">
               <a:rPr lang="de-DE" smtClean="0"/>
               <a:pPr/>
-              <a:t>17.09.2018</a:t>
+              <a:t>30.09.2018</a:t>
             </a:fld>
             <a:endParaRPr lang="de-DE"/>
           </a:p>
@@ -594,7 +594,7 @@
             <a:fld id="{B1816B0C-7247-44DD-BCB7-DAF5E546C78B}" type="datetimeFigureOut">
               <a:rPr lang="de-DE" smtClean="0"/>
               <a:pPr/>
-              <a:t>17.09.2018</a:t>
+              <a:t>30.09.2018</a:t>
             </a:fld>
             <a:endParaRPr lang="de-DE"/>
           </a:p>
@@ -766,7 +766,7 @@
             <a:fld id="{B1816B0C-7247-44DD-BCB7-DAF5E546C78B}" type="datetimeFigureOut">
               <a:rPr lang="de-DE" smtClean="0"/>
               <a:pPr/>
-              <a:t>17.09.2018</a:t>
+              <a:t>30.09.2018</a:t>
             </a:fld>
             <a:endParaRPr lang="de-DE"/>
           </a:p>
@@ -1012,7 +1012,7 @@
             <a:fld id="{B1816B0C-7247-44DD-BCB7-DAF5E546C78B}" type="datetimeFigureOut">
               <a:rPr lang="de-DE" smtClean="0"/>
               <a:pPr/>
-              <a:t>17.09.2018</a:t>
+              <a:t>30.09.2018</a:t>
             </a:fld>
             <a:endParaRPr lang="de-DE"/>
           </a:p>
@@ -1246,7 +1246,7 @@
             <a:fld id="{B1816B0C-7247-44DD-BCB7-DAF5E546C78B}" type="datetimeFigureOut">
               <a:rPr lang="de-DE" smtClean="0"/>
               <a:pPr/>
-              <a:t>17.09.2018</a:t>
+              <a:t>30.09.2018</a:t>
             </a:fld>
             <a:endParaRPr lang="de-DE"/>
           </a:p>
@@ -1615,7 +1615,7 @@
             <a:fld id="{B1816B0C-7247-44DD-BCB7-DAF5E546C78B}" type="datetimeFigureOut">
               <a:rPr lang="de-DE" smtClean="0"/>
               <a:pPr/>
-              <a:t>17.09.2018</a:t>
+              <a:t>30.09.2018</a:t>
             </a:fld>
             <a:endParaRPr lang="de-DE"/>
           </a:p>
@@ -1735,7 +1735,7 @@
             <a:fld id="{B1816B0C-7247-44DD-BCB7-DAF5E546C78B}" type="datetimeFigureOut">
               <a:rPr lang="de-DE" smtClean="0"/>
               <a:pPr/>
-              <a:t>17.09.2018</a:t>
+              <a:t>30.09.2018</a:t>
             </a:fld>
             <a:endParaRPr lang="de-DE"/>
           </a:p>
@@ -1832,7 +1832,7 @@
             <a:fld id="{B1816B0C-7247-44DD-BCB7-DAF5E546C78B}" type="datetimeFigureOut">
               <a:rPr lang="de-DE" smtClean="0"/>
               <a:pPr/>
-              <a:t>17.09.2018</a:t>
+              <a:t>30.09.2018</a:t>
             </a:fld>
             <a:endParaRPr lang="de-DE"/>
           </a:p>
@@ -2111,7 +2111,7 @@
             <a:fld id="{B1816B0C-7247-44DD-BCB7-DAF5E546C78B}" type="datetimeFigureOut">
               <a:rPr lang="de-DE" smtClean="0"/>
               <a:pPr/>
-              <a:t>17.09.2018</a:t>
+              <a:t>30.09.2018</a:t>
             </a:fld>
             <a:endParaRPr lang="de-DE"/>
           </a:p>
@@ -2370,7 +2370,7 @@
             <a:fld id="{B1816B0C-7247-44DD-BCB7-DAF5E546C78B}" type="datetimeFigureOut">
               <a:rPr lang="de-DE" smtClean="0"/>
               <a:pPr/>
-              <a:t>17.09.2018</a:t>
+              <a:t>30.09.2018</a:t>
             </a:fld>
             <a:endParaRPr lang="de-DE"/>
           </a:p>
@@ -2585,7 +2585,7 @@
             <a:fld id="{B1816B0C-7247-44DD-BCB7-DAF5E546C78B}" type="datetimeFigureOut">
               <a:rPr lang="de-DE" smtClean="0"/>
               <a:pPr/>
-              <a:t>17.09.2018</a:t>
+              <a:t>30.09.2018</a:t>
             </a:fld>
             <a:endParaRPr lang="de-DE"/>
           </a:p>
@@ -2993,14 +2993,14 @@
       </p:grpSpPr>
       <p:sp>
         <p:nvSpPr>
-          <p:cNvPr id="89" name="Rectangle 88"/>
+          <p:cNvPr id="82" name="Rectangle 81"/>
           <p:cNvSpPr/>
           <p:nvPr/>
         </p:nvSpPr>
         <p:spPr>
           <a:xfrm>
-            <a:off x="3588221" y="6191449"/>
-            <a:ext cx="1842054" cy="2615925"/>
+            <a:off x="11115708" y="6943740"/>
+            <a:ext cx="1524000" cy="2362200"/>
           </a:xfrm>
           <a:prstGeom prst="rect">
             <a:avLst/>
@@ -3032,59 +3032,20 @@
           <a:lstStyle/>
           <a:p>
             <a:pPr algn="ctr"/>
-            <a:endParaRPr lang="de-DE" sz="1600" dirty="0"/>
-          </a:p>
-        </p:txBody>
-      </p:sp>
-      <p:cxnSp>
-        <p:nvCxnSpPr>
-          <p:cNvPr id="92" name="Straight Connector 16"/>
-          <p:cNvCxnSpPr>
-            <a:stCxn id="6" idx="0"/>
-          </p:cNvCxnSpPr>
-          <p:nvPr/>
-        </p:nvCxnSpPr>
-        <p:spPr>
-          <a:xfrm rot="16200000" flipH="1" flipV="1">
-            <a:off x="3427855" y="3346996"/>
-            <a:ext cx="3176816" cy="2541116"/>
-          </a:xfrm>
-          <a:prstGeom prst="bentConnector3">
-            <a:avLst>
-              <a:gd name="adj1" fmla="val -7332"/>
-            </a:avLst>
-          </a:prstGeom>
-          <a:ln w="25400">
-            <a:solidFill>
-              <a:schemeClr val="tx1"/>
-            </a:solidFill>
-          </a:ln>
-        </p:spPr>
-        <p:style>
-          <a:lnRef idx="1">
-            <a:schemeClr val="accent1"/>
-          </a:lnRef>
-          <a:fillRef idx="0">
-            <a:schemeClr val="accent1"/>
-          </a:fillRef>
-          <a:effectRef idx="0">
-            <a:schemeClr val="accent1"/>
-          </a:effectRef>
-          <a:fontRef idx="minor">
-            <a:schemeClr val="tx1"/>
-          </a:fontRef>
-        </p:style>
-      </p:cxnSp>
-      <p:sp>
-        <p:nvSpPr>
-          <p:cNvPr id="23" name="Rectangle 22"/>
+            <a:endParaRPr lang="de-DE" dirty="0"/>
+          </a:p>
+        </p:txBody>
+      </p:sp>
+      <p:sp>
+        <p:nvSpPr>
+          <p:cNvPr id="89" name="Rectangle 88"/>
           <p:cNvSpPr/>
           <p:nvPr/>
         </p:nvSpPr>
         <p:spPr>
           <a:xfrm>
-            <a:off x="6547639" y="5720833"/>
-            <a:ext cx="3006766" cy="3642321"/>
+            <a:off x="2343621" y="6166049"/>
+            <a:ext cx="1842054" cy="2615925"/>
           </a:xfrm>
           <a:prstGeom prst="rect">
             <a:avLst/>
@@ -3116,24 +3077,68 @@
           <a:lstStyle/>
           <a:p>
             <a:pPr algn="ctr"/>
-            <a:endParaRPr lang="de-DE" dirty="0"/>
-          </a:p>
-        </p:txBody>
-      </p:sp>
-      <p:sp>
-        <p:nvSpPr>
-          <p:cNvPr id="6" name="Rectangle 5"/>
+            <a:endParaRPr lang="de-DE" sz="1600" dirty="0"/>
+          </a:p>
+        </p:txBody>
+      </p:sp>
+      <p:cxnSp>
+        <p:nvCxnSpPr>
+          <p:cNvPr id="92" name="Straight Connector 16"/>
+          <p:cNvCxnSpPr>
+            <a:stCxn id="6" idx="0"/>
+          </p:cNvCxnSpPr>
+          <p:nvPr/>
+        </p:nvCxnSpPr>
+        <p:spPr>
+          <a:xfrm rot="16200000" flipH="1" flipV="1">
+            <a:off x="2183255" y="3321596"/>
+            <a:ext cx="3176816" cy="2541116"/>
+          </a:xfrm>
+          <a:prstGeom prst="bentConnector3">
+            <a:avLst>
+              <a:gd name="adj1" fmla="val -7332"/>
+            </a:avLst>
+          </a:prstGeom>
+          <a:ln w="25400">
+            <a:solidFill>
+              <a:schemeClr val="tx1"/>
+            </a:solidFill>
+          </a:ln>
+        </p:spPr>
+        <p:style>
+          <a:lnRef idx="1">
+            <a:schemeClr val="accent1"/>
+          </a:lnRef>
+          <a:fillRef idx="0">
+            <a:schemeClr val="accent1"/>
+          </a:fillRef>
+          <a:effectRef idx="0">
+            <a:schemeClr val="accent1"/>
+          </a:effectRef>
+          <a:fontRef idx="minor">
+            <a:schemeClr val="tx1"/>
+          </a:fontRef>
+        </p:style>
+      </p:cxnSp>
+      <p:sp>
+        <p:nvSpPr>
+          <p:cNvPr id="23" name="Rectangle 22"/>
           <p:cNvSpPr/>
           <p:nvPr/>
         </p:nvSpPr>
         <p:spPr>
           <a:xfrm>
-            <a:off x="5613435" y="3029147"/>
-            <a:ext cx="1346770" cy="856616"/>
+            <a:off x="5303039" y="5695433"/>
+            <a:ext cx="3006766" cy="3642321"/>
           </a:xfrm>
           <a:prstGeom prst="rect">
             <a:avLst/>
           </a:prstGeom>
+          <a:solidFill>
+            <a:schemeClr val="accent1">
+              <a:alpha val="23000"/>
+            </a:schemeClr>
+          </a:solidFill>
         </p:spPr>
         <p:style>
           <a:lnRef idx="2">
@@ -3156,38 +3161,20 @@
           <a:lstStyle/>
           <a:p>
             <a:pPr algn="ctr"/>
-            <a:r>
-              <a:rPr lang="de-DE" sz="1200" dirty="0" smtClean="0"/>
-              <a:t>IFX1117ME_V33</a:t>
-            </a:r>
-          </a:p>
-          <a:p>
-            <a:pPr algn="ctr"/>
-            <a:r>
-              <a:rPr lang="de-DE" sz="1200" dirty="0" smtClean="0"/>
-              <a:t>3.3V Supply</a:t>
-            </a:r>
-          </a:p>
-          <a:p>
-            <a:pPr algn="ctr"/>
-            <a:r>
-              <a:rPr lang="de-DE" sz="1200" dirty="0" smtClean="0"/>
-              <a:t>I_out_max=1A</a:t>
-            </a:r>
-            <a:endParaRPr lang="de-DE" sz="1200" dirty="0"/>
-          </a:p>
-        </p:txBody>
-      </p:sp>
-      <p:sp>
-        <p:nvSpPr>
-          <p:cNvPr id="7" name="Rectangle 6"/>
+            <a:endParaRPr lang="de-DE" dirty="0"/>
+          </a:p>
+        </p:txBody>
+      </p:sp>
+      <p:sp>
+        <p:nvSpPr>
+          <p:cNvPr id="6" name="Rectangle 5"/>
           <p:cNvSpPr/>
           <p:nvPr/>
         </p:nvSpPr>
         <p:spPr>
           <a:xfrm>
-            <a:off x="7095379" y="4559664"/>
-            <a:ext cx="1102848" cy="856616"/>
+            <a:off x="4368835" y="3003747"/>
+            <a:ext cx="1346770" cy="856616"/>
           </a:xfrm>
           <a:prstGeom prst="rect">
             <a:avLst/>
@@ -3216,72 +3203,35 @@
             <a:pPr algn="ctr"/>
             <a:r>
               <a:rPr lang="de-DE" sz="1200" dirty="0" smtClean="0"/>
-              <a:t>2x16 LCD</a:t>
+              <a:t>IFX1117ME_V33</a:t>
             </a:r>
           </a:p>
           <a:p>
             <a:pPr algn="ctr"/>
             <a:r>
               <a:rPr lang="de-DE" sz="1200" dirty="0" smtClean="0"/>
-              <a:t>Display</a:t>
+              <a:t>3.3V Supply</a:t>
             </a:r>
           </a:p>
           <a:p>
             <a:pPr algn="ctr"/>
             <a:r>
               <a:rPr lang="de-DE" sz="1200" dirty="0" smtClean="0"/>
-              <a:t>I=3mA</a:t>
+              <a:t>I_out_max=1A</a:t>
             </a:r>
             <a:endParaRPr lang="de-DE" sz="1200" dirty="0"/>
           </a:p>
         </p:txBody>
       </p:sp>
-      <p:cxnSp>
-        <p:nvCxnSpPr>
-          <p:cNvPr id="9" name="Straight Connector 8"/>
-          <p:cNvCxnSpPr>
-            <a:endCxn id="7" idx="1"/>
-          </p:cNvCxnSpPr>
-          <p:nvPr/>
-        </p:nvCxnSpPr>
-        <p:spPr>
-          <a:xfrm>
-            <a:off x="6931305" y="4987971"/>
-            <a:ext cx="164072" cy="1618"/>
-          </a:xfrm>
-          <a:prstGeom prst="line">
-            <a:avLst/>
-          </a:prstGeom>
-          <a:ln w="25400">
-            <a:solidFill>
-              <a:schemeClr val="tx1"/>
-            </a:solidFill>
-          </a:ln>
-        </p:spPr>
-        <p:style>
-          <a:lnRef idx="1">
-            <a:schemeClr val="accent1"/>
-          </a:lnRef>
-          <a:fillRef idx="0">
-            <a:schemeClr val="accent1"/>
-          </a:fillRef>
-          <a:effectRef idx="0">
-            <a:schemeClr val="accent1"/>
-          </a:effectRef>
-          <a:fontRef idx="minor">
-            <a:schemeClr val="tx1"/>
-          </a:fontRef>
-        </p:style>
-      </p:cxnSp>
-      <p:sp>
-        <p:nvSpPr>
-          <p:cNvPr id="13" name="Rectangle 12"/>
+      <p:sp>
+        <p:nvSpPr>
+          <p:cNvPr id="7" name="Rectangle 6"/>
           <p:cNvSpPr/>
           <p:nvPr/>
         </p:nvSpPr>
         <p:spPr>
           <a:xfrm>
-            <a:off x="1635755" y="3029147"/>
+            <a:off x="5850779" y="4534264"/>
             <a:ext cx="1102848" cy="856616"/>
           </a:xfrm>
           <a:prstGeom prst="rect">
@@ -3310,6 +3260,101 @@
           <a:p>
             <a:pPr algn="ctr"/>
             <a:r>
+              <a:rPr lang="de-DE" sz="1200" dirty="0" smtClean="0"/>
+              <a:t>2x16 LCD</a:t>
+            </a:r>
+          </a:p>
+          <a:p>
+            <a:pPr algn="ctr"/>
+            <a:r>
+              <a:rPr lang="de-DE" sz="1200" dirty="0" smtClean="0"/>
+              <a:t>Display</a:t>
+            </a:r>
+          </a:p>
+          <a:p>
+            <a:pPr algn="ctr"/>
+            <a:r>
+              <a:rPr lang="de-DE" sz="1200" dirty="0" smtClean="0"/>
+              <a:t>I=3mA</a:t>
+            </a:r>
+            <a:endParaRPr lang="de-DE" sz="1200" dirty="0"/>
+          </a:p>
+        </p:txBody>
+      </p:sp>
+      <p:cxnSp>
+        <p:nvCxnSpPr>
+          <p:cNvPr id="9" name="Straight Connector 8"/>
+          <p:cNvCxnSpPr>
+            <a:endCxn id="7" idx="1"/>
+          </p:cNvCxnSpPr>
+          <p:nvPr/>
+        </p:nvCxnSpPr>
+        <p:spPr>
+          <a:xfrm>
+            <a:off x="5686705" y="4962571"/>
+            <a:ext cx="164072" cy="1618"/>
+          </a:xfrm>
+          <a:prstGeom prst="line">
+            <a:avLst/>
+          </a:prstGeom>
+          <a:ln w="25400">
+            <a:solidFill>
+              <a:schemeClr val="tx1"/>
+            </a:solidFill>
+          </a:ln>
+        </p:spPr>
+        <p:style>
+          <a:lnRef idx="1">
+            <a:schemeClr val="accent1"/>
+          </a:lnRef>
+          <a:fillRef idx="0">
+            <a:schemeClr val="accent1"/>
+          </a:fillRef>
+          <a:effectRef idx="0">
+            <a:schemeClr val="accent1"/>
+          </a:effectRef>
+          <a:fontRef idx="minor">
+            <a:schemeClr val="tx1"/>
+          </a:fontRef>
+        </p:style>
+      </p:cxnSp>
+      <p:sp>
+        <p:nvSpPr>
+          <p:cNvPr id="13" name="Rectangle 12"/>
+          <p:cNvSpPr/>
+          <p:nvPr/>
+        </p:nvSpPr>
+        <p:spPr>
+          <a:xfrm>
+            <a:off x="391155" y="3003747"/>
+            <a:ext cx="1102848" cy="856616"/>
+          </a:xfrm>
+          <a:prstGeom prst="rect">
+            <a:avLst/>
+          </a:prstGeom>
+        </p:spPr>
+        <p:style>
+          <a:lnRef idx="2">
+            <a:schemeClr val="accent1">
+              <a:shade val="50000"/>
+            </a:schemeClr>
+          </a:lnRef>
+          <a:fillRef idx="1">
+            <a:schemeClr val="accent1"/>
+          </a:fillRef>
+          <a:effectRef idx="0">
+            <a:schemeClr val="accent1"/>
+          </a:effectRef>
+          <a:fontRef idx="minor">
+            <a:schemeClr val="lt1"/>
+          </a:fontRef>
+        </p:style>
+        <p:txBody>
+          <a:bodyPr lIns="91423" tIns="45712" rIns="91423" bIns="45712" rtlCol="0" anchor="ctr"/>
+          <a:lstStyle/>
+          <a:p>
+            <a:pPr algn="ctr"/>
+            <a:r>
               <a:rPr lang="de-DE" sz="1600" dirty="0" smtClean="0"/>
               <a:t>USB</a:t>
             </a:r>
@@ -3328,7 +3373,7 @@
         </p:nvCxnSpPr>
         <p:spPr>
           <a:xfrm>
-            <a:off x="2738603" y="3457455"/>
+            <a:off x="1494003" y="3432055"/>
             <a:ext cx="2874832" cy="1588"/>
           </a:xfrm>
           <a:prstGeom prst="line">
@@ -3365,7 +3410,7 @@
         </p:nvCxnSpPr>
         <p:spPr>
           <a:xfrm>
-            <a:off x="4178304" y="3454402"/>
+            <a:off x="2933704" y="3429002"/>
             <a:ext cx="2917075" cy="1533570"/>
           </a:xfrm>
           <a:prstGeom prst="bentConnector3">
@@ -3403,7 +3448,7 @@
         </p:nvSpPr>
         <p:spPr>
           <a:xfrm>
-            <a:off x="8664310" y="5862964"/>
+            <a:off x="7419710" y="5837564"/>
             <a:ext cx="625114" cy="572348"/>
           </a:xfrm>
           <a:prstGeom prst="rect">
@@ -3447,7 +3492,7 @@
         </p:nvSpPr>
         <p:spPr>
           <a:xfrm>
-            <a:off x="6723181" y="6155273"/>
+            <a:off x="5478581" y="6129873"/>
             <a:ext cx="1639710" cy="1323423"/>
           </a:xfrm>
           <a:prstGeom prst="rect">
@@ -3465,7 +3510,6 @@
               <a:rPr lang="de-DE" sz="1600" dirty="0" smtClean="0"/>
               <a:t>ATMEGA16A</a:t>
             </a:r>
-            <a:endParaRPr lang="de-DE" sz="1600" dirty="0" smtClean="0"/>
           </a:p>
           <a:p>
             <a:pPr marL="381780" indent="-381780">
@@ -3484,9 +3528,8 @@
             </a:pPr>
             <a:r>
               <a:rPr lang="de-DE" sz="1600" dirty="0" smtClean="0"/>
-              <a:t>I=15mA</a:t>
-            </a:r>
-            <a:endParaRPr lang="de-DE" sz="1600" dirty="0" smtClean="0"/>
+              <a:t>I=0.6mA</a:t>
+            </a:r>
           </a:p>
           <a:p>
             <a:pPr marL="381780" indent="-381780">
@@ -3519,7 +3562,7 @@
         </p:nvSpPr>
         <p:spPr>
           <a:xfrm>
-            <a:off x="8425442" y="4559664"/>
+            <a:off x="7180842" y="4534264"/>
             <a:ext cx="1102848" cy="856616"/>
           </a:xfrm>
           <a:prstGeom prst="rect">
@@ -3580,7 +3623,7 @@
         </p:nvCxnSpPr>
         <p:spPr>
           <a:xfrm>
-            <a:off x="8198226" y="4987971"/>
+            <a:off x="6953626" y="4962571"/>
             <a:ext cx="227216" cy="1618"/>
           </a:xfrm>
           <a:prstGeom prst="line">
@@ -3618,7 +3661,7 @@
         </p:nvCxnSpPr>
         <p:spPr>
           <a:xfrm flipV="1">
-            <a:off x="8976866" y="5416279"/>
+            <a:off x="7732266" y="5390879"/>
             <a:ext cx="0" cy="446686"/>
           </a:xfrm>
           <a:prstGeom prst="line">
@@ -3653,7 +3696,7 @@
         </p:nvSpPr>
         <p:spPr>
           <a:xfrm>
-            <a:off x="11644733" y="8393580"/>
+            <a:off x="9752433" y="7085480"/>
             <a:ext cx="1102848" cy="856616"/>
           </a:xfrm>
           <a:prstGeom prst="rect">
@@ -3711,8 +3754,8 @@
         </p:nvCxnSpPr>
         <p:spPr>
           <a:xfrm>
-            <a:off x="6960205" y="3457455"/>
-            <a:ext cx="5235952" cy="4936125"/>
+            <a:off x="5715605" y="3432055"/>
+            <a:ext cx="4588252" cy="3653425"/>
           </a:xfrm>
           <a:prstGeom prst="bentConnector2">
             <a:avLst/>
@@ -3741,16 +3784,20 @@
       <p:cxnSp>
         <p:nvCxnSpPr>
           <p:cNvPr id="53" name="Straight Connector 16"/>
-          <p:cNvCxnSpPr/>
+          <p:cNvCxnSpPr>
+            <a:stCxn id="52" idx="0"/>
+          </p:cNvCxnSpPr>
           <p:nvPr/>
         </p:nvCxnSpPr>
         <p:spPr>
           <a:xfrm rot="16200000" flipV="1">
-            <a:off x="9505952" y="5289551"/>
-            <a:ext cx="3682999" cy="12699"/>
-          </a:xfrm>
-          <a:prstGeom prst="straightConnector1">
-            <a:avLst/>
+            <a:off x="8685712" y="5055688"/>
+            <a:ext cx="4924256" cy="1670880"/>
+          </a:xfrm>
+          <a:prstGeom prst="bentConnector3">
+            <a:avLst>
+              <a:gd name="adj1" fmla="val 99518"/>
+            </a:avLst>
           </a:prstGeom>
           <a:ln w="25400">
             <a:solidFill>
@@ -3782,7 +3829,7 @@
         </p:nvSpPr>
         <p:spPr>
           <a:xfrm>
-            <a:off x="10079716" y="5720830"/>
+            <a:off x="8835116" y="5695430"/>
             <a:ext cx="1102848" cy="856616"/>
           </a:xfrm>
           <a:prstGeom prst="rect">
@@ -3837,7 +3884,7 @@
         </p:nvCxnSpPr>
         <p:spPr>
           <a:xfrm flipH="1">
-            <a:off x="9289423" y="6149139"/>
+            <a:off x="8044823" y="6123739"/>
             <a:ext cx="790292" cy="1"/>
           </a:xfrm>
           <a:prstGeom prst="line">
@@ -3872,7 +3919,7 @@
         </p:nvSpPr>
         <p:spPr>
           <a:xfrm>
-            <a:off x="8664310" y="7250786"/>
+            <a:off x="7419710" y="7225386"/>
             <a:ext cx="625114" cy="572348"/>
           </a:xfrm>
           <a:prstGeom prst="rect">
@@ -3901,10 +3948,10 @@
           <a:p>
             <a:pPr algn="ctr"/>
             <a:r>
-              <a:rPr lang="de-DE" sz="1600" dirty="0" smtClean="0"/>
-              <a:t>SPI</a:t>
-            </a:r>
-            <a:endParaRPr lang="de-DE" sz="1600" dirty="0"/>
+              <a:rPr lang="de-DE" sz="1400" dirty="0" smtClean="0"/>
+              <a:t>UART</a:t>
+            </a:r>
+            <a:endParaRPr lang="de-DE" sz="1400" dirty="0"/>
           </a:p>
         </p:txBody>
       </p:sp>
@@ -3916,7 +3963,7 @@
         </p:nvSpPr>
         <p:spPr>
           <a:xfrm>
-            <a:off x="8664310" y="8521802"/>
+            <a:off x="7419710" y="8496402"/>
             <a:ext cx="625114" cy="572348"/>
           </a:xfrm>
           <a:prstGeom prst="rect">
@@ -3946,7 +3993,7 @@
             <a:pPr algn="ctr"/>
             <a:r>
               <a:rPr lang="de-DE" sz="1600" dirty="0" smtClean="0"/>
-              <a:t>UART</a:t>
+              <a:t>SPI</a:t>
             </a:r>
             <a:endParaRPr lang="de-DE" sz="1600" dirty="0"/>
           </a:p>
@@ -3957,14 +4004,14 @@
           <p:cNvPr id="75" name="Straight Connector 74"/>
           <p:cNvCxnSpPr>
             <a:stCxn id="52" idx="1"/>
-            <a:endCxn id="73" idx="3"/>
+            <a:endCxn id="74" idx="3"/>
           </p:cNvCxnSpPr>
           <p:nvPr/>
         </p:nvCxnSpPr>
         <p:spPr>
-          <a:xfrm flipH="1" flipV="1">
-            <a:off x="9289423" y="7536960"/>
-            <a:ext cx="1520132" cy="3"/>
+          <a:xfrm rot="10800000" flipV="1">
+            <a:off x="8044824" y="8781564"/>
+            <a:ext cx="3387032" cy="1012"/>
           </a:xfrm>
           <a:prstGeom prst="line">
             <a:avLst/>
@@ -3995,14 +4042,14 @@
           <p:cNvPr id="78" name="Straight Connector 77"/>
           <p:cNvCxnSpPr>
             <a:stCxn id="46" idx="1"/>
-            <a:endCxn id="74" idx="3"/>
+            <a:endCxn id="73" idx="3"/>
           </p:cNvCxnSpPr>
           <p:nvPr/>
         </p:nvCxnSpPr>
         <p:spPr>
-          <a:xfrm flipH="1" flipV="1">
-            <a:off x="9289423" y="8807976"/>
-            <a:ext cx="2355309" cy="13911"/>
+          <a:xfrm rot="10800000">
+            <a:off x="8044825" y="7511560"/>
+            <a:ext cx="1707609" cy="2228"/>
           </a:xfrm>
           <a:prstGeom prst="line">
             <a:avLst/>
@@ -4036,7 +4083,7 @@
         </p:nvSpPr>
         <p:spPr>
           <a:xfrm>
-            <a:off x="3977204" y="8089411"/>
+            <a:off x="2732604" y="8064011"/>
             <a:ext cx="561542" cy="608337"/>
           </a:xfrm>
           <a:prstGeom prst="plus">
@@ -4078,7 +4125,7 @@
         </p:nvSpPr>
         <p:spPr>
           <a:xfrm>
-            <a:off x="4752579" y="8089411"/>
+            <a:off x="3507979" y="8064011"/>
             <a:ext cx="216568" cy="234615"/>
           </a:xfrm>
           <a:prstGeom prst="ellipse">
@@ -4118,7 +4165,7 @@
         </p:nvSpPr>
         <p:spPr>
           <a:xfrm>
-            <a:off x="4754241" y="8478532"/>
+            <a:off x="3509641" y="8453132"/>
             <a:ext cx="216568" cy="234615"/>
           </a:xfrm>
           <a:prstGeom prst="ellipse">
@@ -4158,7 +4205,7 @@
         </p:nvSpPr>
         <p:spPr>
           <a:xfrm>
-            <a:off x="3974148" y="7070589"/>
+            <a:off x="2729548" y="7045189"/>
             <a:ext cx="1102848" cy="856616"/>
           </a:xfrm>
           <a:prstGeom prst="rect">
@@ -4221,7 +4268,7 @@
         </p:nvSpPr>
         <p:spPr>
           <a:xfrm>
-            <a:off x="3707977" y="6346140"/>
+            <a:off x="2463377" y="6320740"/>
             <a:ext cx="1441963" cy="338538"/>
           </a:xfrm>
           <a:prstGeom prst="rect">
@@ -4251,7 +4298,7 @@
         </p:nvCxnSpPr>
         <p:spPr>
           <a:xfrm>
-            <a:off x="5444791" y="6828382"/>
+            <a:off x="4200191" y="6802982"/>
             <a:ext cx="1102848" cy="0"/>
           </a:xfrm>
           <a:prstGeom prst="line">
@@ -4286,7 +4333,7 @@
         </p:nvSpPr>
         <p:spPr>
           <a:xfrm>
-            <a:off x="10452096" y="5399314"/>
+            <a:off x="9207496" y="5373914"/>
             <a:ext cx="919999" cy="307760"/>
           </a:xfrm>
           <a:prstGeom prst="rect">
@@ -4325,7 +4372,7 @@
         </p:nvSpPr>
         <p:spPr>
           <a:xfrm>
-            <a:off x="12103099" y="8120743"/>
+            <a:off x="10210799" y="6812643"/>
             <a:ext cx="812801" cy="307760"/>
           </a:xfrm>
           <a:prstGeom prst="rect">
@@ -4358,14 +4405,14 @@
       </p:sp>
       <p:sp>
         <p:nvSpPr>
-          <p:cNvPr id="36" name="TextBox 35"/>
+          <p:cNvPr id="61" name="TextBox 60"/>
           <p:cNvSpPr txBox="1"/>
           <p:nvPr/>
         </p:nvSpPr>
         <p:spPr>
           <a:xfrm>
-            <a:off x="11264899" y="6805384"/>
-            <a:ext cx="866758" cy="307760"/>
+            <a:off x="5622442" y="3060700"/>
+            <a:ext cx="1311758" cy="307760"/>
           </a:xfrm>
           <a:prstGeom prst="rect">
             <a:avLst/>
@@ -4385,7 +4432,7 @@
                   <a:srgbClr val="FF0000"/>
                 </a:solidFill>
               </a:rPr>
-              <a:t>660mW</a:t>
+              <a:t>3.3W / 1.44w </a:t>
             </a:r>
             <a:endParaRPr lang="en-GB" sz="1400" dirty="0">
               <a:solidFill>
@@ -4397,52 +4444,13 @@
       </p:sp>
       <p:sp>
         <p:nvSpPr>
-          <p:cNvPr id="61" name="TextBox 60"/>
-          <p:cNvSpPr txBox="1"/>
-          <p:nvPr/>
-        </p:nvSpPr>
-        <p:spPr>
-          <a:xfrm>
-            <a:off x="6867042" y="3086100"/>
-            <a:ext cx="1311758" cy="307760"/>
-          </a:xfrm>
-          <a:prstGeom prst="rect">
-            <a:avLst/>
-          </a:prstGeom>
-          <a:noFill/>
-        </p:spPr>
-        <p:txBody>
-          <a:bodyPr wrap="square" lIns="91423" tIns="45712" rIns="91423" bIns="45712" rtlCol="0">
-            <a:spAutoFit/>
-          </a:bodyPr>
-          <a:lstStyle/>
-          <a:p>
-            <a:pPr algn="ctr"/>
-            <a:r>
-              <a:rPr lang="de-DE" sz="1400" dirty="0" smtClean="0">
-                <a:solidFill>
-                  <a:srgbClr val="FF0000"/>
-                </a:solidFill>
-              </a:rPr>
-              <a:t>3.3W / 1.48w </a:t>
-            </a:r>
-            <a:endParaRPr lang="en-GB" sz="1400" dirty="0">
-              <a:solidFill>
-                <a:srgbClr val="FF0000"/>
-              </a:solidFill>
-            </a:endParaRPr>
-          </a:p>
-        </p:txBody>
-      </p:sp>
-      <p:sp>
-        <p:nvSpPr>
           <p:cNvPr id="63" name="TextBox 62"/>
           <p:cNvSpPr txBox="1"/>
           <p:nvPr/>
         </p:nvSpPr>
         <p:spPr>
           <a:xfrm>
-            <a:off x="8769104" y="5421286"/>
+            <a:off x="7524504" y="5395886"/>
             <a:ext cx="1200395" cy="338538"/>
           </a:xfrm>
           <a:prstGeom prst="rect">
@@ -4463,7 +4471,7 @@
                   <a:srgbClr val="FF0000"/>
                 </a:solidFill>
               </a:rPr>
-              <a:t>50mW</a:t>
+              <a:t>2mW</a:t>
             </a:r>
             <a:endParaRPr lang="en-GB" sz="1600" dirty="0">
               <a:solidFill>
@@ -4481,7 +4489,7 @@
         </p:nvCxnSpPr>
         <p:spPr>
           <a:xfrm rot="5400000">
-            <a:off x="8449298" y="4588325"/>
+            <a:off x="7204698" y="4562925"/>
             <a:ext cx="2397333" cy="161266"/>
           </a:xfrm>
           <a:prstGeom prst="bentConnector3">
@@ -4520,7 +4528,7 @@
         </p:nvSpPr>
         <p:spPr>
           <a:xfrm>
-            <a:off x="6166953" y="2752828"/>
+            <a:off x="4922353" y="2727428"/>
             <a:ext cx="962509" cy="307760"/>
           </a:xfrm>
           <a:prstGeom prst="rect">
@@ -4559,7 +4567,7 @@
         </p:nvSpPr>
         <p:spPr>
           <a:xfrm>
-            <a:off x="5991226" y="4057754"/>
+            <a:off x="4746626" y="4032354"/>
             <a:ext cx="1073345" cy="307760"/>
           </a:xfrm>
           <a:prstGeom prst="rect">
@@ -4598,7 +4606,7 @@
         </p:nvSpPr>
         <p:spPr>
           <a:xfrm>
-            <a:off x="5219215" y="2748065"/>
+            <a:off x="3974615" y="2722665"/>
             <a:ext cx="843447" cy="307760"/>
           </a:xfrm>
           <a:prstGeom prst="rect">
@@ -4637,7 +4645,7 @@
         </p:nvSpPr>
         <p:spPr>
           <a:xfrm>
-            <a:off x="2741386" y="3116943"/>
+            <a:off x="1496786" y="3091543"/>
             <a:ext cx="948602" cy="307760"/>
           </a:xfrm>
           <a:prstGeom prst="rect">
@@ -4658,7 +4666,7 @@
                   <a:srgbClr val="00B050"/>
                 </a:solidFill>
               </a:rPr>
-              <a:t>470mA</a:t>
+              <a:t>450mA</a:t>
             </a:r>
             <a:endParaRPr lang="en-GB" sz="1400" dirty="0">
               <a:solidFill>
@@ -4676,7 +4684,7 @@
         </p:nvSpPr>
         <p:spPr>
           <a:xfrm>
-            <a:off x="10809556" y="7108656"/>
+            <a:off x="11431856" y="8353256"/>
             <a:ext cx="1102848" cy="856616"/>
           </a:xfrm>
           <a:prstGeom prst="rect">
@@ -4729,7 +4737,7 @@
         </p:nvCxnSpPr>
         <p:spPr>
           <a:xfrm rot="16200000" flipV="1">
-            <a:off x="9484608" y="4574297"/>
+            <a:off x="8240008" y="4548897"/>
             <a:ext cx="2266428" cy="26637"/>
           </a:xfrm>
           <a:prstGeom prst="straightConnector1">
@@ -4765,7 +4773,7 @@
         </p:nvSpPr>
         <p:spPr>
           <a:xfrm>
-            <a:off x="6867042" y="3517900"/>
+            <a:off x="5622442" y="3492500"/>
             <a:ext cx="1311758" cy="307760"/>
           </a:xfrm>
           <a:prstGeom prst="rect">
@@ -4786,7 +4794,7 @@
                   <a:srgbClr val="00B050"/>
                 </a:solidFill>
               </a:rPr>
-              <a:t>1A / 460mA </a:t>
+              <a:t>1A / 450mA </a:t>
             </a:r>
             <a:endParaRPr lang="en-GB" sz="1400" dirty="0">
               <a:solidFill>
@@ -4804,7 +4812,7 @@
         </p:nvSpPr>
         <p:spPr>
           <a:xfrm>
-            <a:off x="5536715" y="4614965"/>
+            <a:off x="4292115" y="4589565"/>
             <a:ext cx="843447" cy="307760"/>
           </a:xfrm>
           <a:prstGeom prst="rect">
@@ -4830,6 +4838,147 @@
             <a:endParaRPr lang="en-GB" sz="1400" dirty="0">
               <a:solidFill>
                 <a:srgbClr val="3333FF"/>
+              </a:solidFill>
+            </a:endParaRPr>
+          </a:p>
+        </p:txBody>
+      </p:sp>
+      <p:sp>
+        <p:nvSpPr>
+          <p:cNvPr id="96" name="Rectangle 95"/>
+          <p:cNvSpPr/>
+          <p:nvPr/>
+        </p:nvSpPr>
+        <p:spPr>
+          <a:xfrm>
+            <a:off x="10568256" y="5737056"/>
+            <a:ext cx="1102848" cy="856616"/>
+          </a:xfrm>
+          <a:prstGeom prst="rect">
+            <a:avLst/>
+          </a:prstGeom>
+        </p:spPr>
+        <p:style>
+          <a:lnRef idx="2">
+            <a:schemeClr val="accent1">
+              <a:shade val="50000"/>
+            </a:schemeClr>
+          </a:lnRef>
+          <a:fillRef idx="1">
+            <a:schemeClr val="accent1"/>
+          </a:fillRef>
+          <a:effectRef idx="0">
+            <a:schemeClr val="accent1"/>
+          </a:effectRef>
+          <a:fontRef idx="minor">
+            <a:schemeClr val="lt1"/>
+          </a:fontRef>
+        </p:style>
+        <p:txBody>
+          <a:bodyPr lIns="91423" tIns="45712" rIns="91423" bIns="45712" rtlCol="0" anchor="ctr"/>
+          <a:lstStyle/>
+          <a:p>
+            <a:pPr algn="ctr"/>
+            <a:r>
+              <a:rPr lang="de-DE" sz="1200" dirty="0" smtClean="0"/>
+              <a:t>Memory</a:t>
+            </a:r>
+          </a:p>
+          <a:p>
+            <a:pPr algn="ctr"/>
+            <a:r>
+              <a:rPr lang="de-DE" sz="1200" dirty="0" smtClean="0"/>
+              <a:t>Imax=200mA</a:t>
+            </a:r>
+            <a:endParaRPr lang="de-DE" sz="1200" dirty="0"/>
+          </a:p>
+        </p:txBody>
+      </p:sp>
+      <p:sp>
+        <p:nvSpPr>
+          <p:cNvPr id="50" name="Rectangle 49"/>
+          <p:cNvSpPr/>
+          <p:nvPr/>
+        </p:nvSpPr>
+        <p:spPr>
+          <a:xfrm>
+            <a:off x="11431856" y="7314228"/>
+            <a:ext cx="1102848" cy="623272"/>
+          </a:xfrm>
+          <a:prstGeom prst="rect">
+            <a:avLst/>
+          </a:prstGeom>
+        </p:spPr>
+        <p:style>
+          <a:lnRef idx="2">
+            <a:schemeClr val="accent1">
+              <a:shade val="50000"/>
+            </a:schemeClr>
+          </a:lnRef>
+          <a:fillRef idx="1">
+            <a:schemeClr val="accent1"/>
+          </a:fillRef>
+          <a:effectRef idx="0">
+            <a:schemeClr val="accent1"/>
+          </a:effectRef>
+          <a:fontRef idx="minor">
+            <a:schemeClr val="lt1"/>
+          </a:fontRef>
+        </p:style>
+        <p:txBody>
+          <a:bodyPr lIns="91423" tIns="45712" rIns="91423" bIns="45712" rtlCol="0" anchor="ctr"/>
+          <a:lstStyle/>
+          <a:p>
+            <a:pPr algn="ctr"/>
+            <a:r>
+              <a:rPr lang="de-DE" sz="1200" dirty="0" smtClean="0"/>
+              <a:t>Buffer</a:t>
+            </a:r>
+          </a:p>
+          <a:p>
+            <a:pPr algn="ctr"/>
+            <a:r>
+              <a:rPr lang="en-GB" sz="1200" dirty="0" smtClean="0"/>
+              <a:t>SN74LVC125A</a:t>
+            </a:r>
+            <a:endParaRPr lang="de-DE" sz="1200" dirty="0"/>
+          </a:p>
+        </p:txBody>
+      </p:sp>
+      <p:sp>
+        <p:nvSpPr>
+          <p:cNvPr id="36" name="TextBox 35"/>
+          <p:cNvSpPr txBox="1"/>
+          <p:nvPr/>
+        </p:nvSpPr>
+        <p:spPr>
+          <a:xfrm>
+            <a:off x="11884042" y="6959600"/>
+            <a:ext cx="866758" cy="307760"/>
+          </a:xfrm>
+          <a:prstGeom prst="rect">
+            <a:avLst/>
+          </a:prstGeom>
+          <a:noFill/>
+        </p:spPr>
+        <p:txBody>
+          <a:bodyPr wrap="square" lIns="91423" tIns="45712" rIns="91423" bIns="45712" rtlCol="0">
+            <a:spAutoFit/>
+          </a:bodyPr>
+          <a:lstStyle/>
+          <a:p>
+            <a:pPr algn="ctr"/>
+            <a:r>
+              <a:rPr lang="de-DE" sz="1400" dirty="0" smtClean="0">
+                <a:solidFill>
+                  <a:srgbClr val="FF0000"/>
+                </a:solidFill>
+              </a:rPr>
+              <a:t>660mW</a:t>
+            </a:r>
+            <a:endParaRPr lang="en-GB" sz="1400" dirty="0">
+              <a:solidFill>
+                <a:srgbClr val="FF0000"/>
               </a:solidFill>
             </a:endParaRPr>
           </a:p>
@@ -5410,7 +5559,6 @@
               <a:rPr lang="de-DE" sz="1600" dirty="0" smtClean="0"/>
               <a:t>ATMEGA16A</a:t>
             </a:r>
-            <a:endParaRPr lang="de-DE" sz="1600" dirty="0" smtClean="0"/>
           </a:p>
           <a:p>
             <a:pPr marL="381780" indent="-381780">
@@ -5431,7 +5579,6 @@
               <a:rPr lang="de-DE" sz="1600" dirty="0" smtClean="0"/>
               <a:t>I=15mA</a:t>
             </a:r>
-            <a:endParaRPr lang="de-DE" sz="1600" dirty="0" smtClean="0"/>
           </a:p>
           <a:p>
             <a:pPr marL="381780" indent="-381780">
@@ -6780,6 +6927,45 @@
           </a:fontRef>
         </p:style>
       </p:cxnSp>
+      <p:sp>
+        <p:nvSpPr>
+          <p:cNvPr id="48" name="TextBox 47"/>
+          <p:cNvSpPr txBox="1"/>
+          <p:nvPr/>
+        </p:nvSpPr>
+        <p:spPr>
+          <a:xfrm>
+            <a:off x="4406901" y="1473200"/>
+            <a:ext cx="2062162" cy="769425"/>
+          </a:xfrm>
+          <a:prstGeom prst="rect">
+            <a:avLst/>
+          </a:prstGeom>
+          <a:noFill/>
+        </p:spPr>
+        <p:txBody>
+          <a:bodyPr wrap="square" lIns="91423" tIns="45712" rIns="91423" bIns="45712" rtlCol="0">
+            <a:spAutoFit/>
+          </a:bodyPr>
+          <a:lstStyle/>
+          <a:p>
+            <a:pPr algn="ctr"/>
+            <a:r>
+              <a:rPr lang="de-DE" sz="4400" dirty="0" smtClean="0">
+                <a:solidFill>
+                  <a:srgbClr val="3333FF"/>
+                </a:solidFill>
+              </a:rPr>
+              <a:t>OLD</a:t>
+            </a:r>
+            <a:endParaRPr lang="en-GB" sz="4400" dirty="0">
+              <a:solidFill>
+                <a:srgbClr val="3333FF"/>
+              </a:solidFill>
+            </a:endParaRPr>
+          </a:p>
+        </p:txBody>
+      </p:sp>
     </p:spTree>
     <p:extLst>
       <p:ext uri="{BB962C8B-B14F-4D97-AF65-F5344CB8AC3E}">

</xml_diff>

<commit_message>
feat: set up layout
</commit_message>
<xml_diff>
--- a/Projects/CameraSystem/Docs/Block_Diagram.pptx
+++ b/Projects/CameraSystem/Docs/Block_Diagram.pptx
@@ -240,7 +240,7 @@
             <a:fld id="{B1816B0C-7247-44DD-BCB7-DAF5E546C78B}" type="datetimeFigureOut">
               <a:rPr lang="de-DE" smtClean="0"/>
               <a:pPr/>
-              <a:t>30.09.2018</a:t>
+              <a:t>03.10.2018</a:t>
             </a:fld>
             <a:endParaRPr lang="de-DE"/>
           </a:p>
@@ -292,7 +292,7 @@
     </p:spTree>
     <p:extLst>
       <p:ext uri="{BB962C8B-B14F-4D97-AF65-F5344CB8AC3E}">
-        <p14:creationId xmlns:p14="http://schemas.microsoft.com/office/powerpoint/2010/main" xmlns="" val="4183135021"/>
+        <p14:creationId xmlns="" xmlns:p14="http://schemas.microsoft.com/office/powerpoint/2010/main" val="4183135021"/>
       </p:ext>
     </p:extLst>
   </p:cSld>
@@ -412,7 +412,7 @@
             <a:fld id="{B1816B0C-7247-44DD-BCB7-DAF5E546C78B}" type="datetimeFigureOut">
               <a:rPr lang="de-DE" smtClean="0"/>
               <a:pPr/>
-              <a:t>30.09.2018</a:t>
+              <a:t>03.10.2018</a:t>
             </a:fld>
             <a:endParaRPr lang="de-DE"/>
           </a:p>
@@ -464,7 +464,7 @@
     </p:spTree>
     <p:extLst>
       <p:ext uri="{BB962C8B-B14F-4D97-AF65-F5344CB8AC3E}">
-        <p14:creationId xmlns:p14="http://schemas.microsoft.com/office/powerpoint/2010/main" xmlns="" val="634728941"/>
+        <p14:creationId xmlns="" xmlns:p14="http://schemas.microsoft.com/office/powerpoint/2010/main" val="634728941"/>
       </p:ext>
     </p:extLst>
   </p:cSld>
@@ -594,7 +594,7 @@
             <a:fld id="{B1816B0C-7247-44DD-BCB7-DAF5E546C78B}" type="datetimeFigureOut">
               <a:rPr lang="de-DE" smtClean="0"/>
               <a:pPr/>
-              <a:t>30.09.2018</a:t>
+              <a:t>03.10.2018</a:t>
             </a:fld>
             <a:endParaRPr lang="de-DE"/>
           </a:p>
@@ -646,7 +646,7 @@
     </p:spTree>
     <p:extLst>
       <p:ext uri="{BB962C8B-B14F-4D97-AF65-F5344CB8AC3E}">
-        <p14:creationId xmlns:p14="http://schemas.microsoft.com/office/powerpoint/2010/main" xmlns="" val="2163732138"/>
+        <p14:creationId xmlns="" xmlns:p14="http://schemas.microsoft.com/office/powerpoint/2010/main" val="2163732138"/>
       </p:ext>
     </p:extLst>
   </p:cSld>
@@ -766,7 +766,7 @@
             <a:fld id="{B1816B0C-7247-44DD-BCB7-DAF5E546C78B}" type="datetimeFigureOut">
               <a:rPr lang="de-DE" smtClean="0"/>
               <a:pPr/>
-              <a:t>30.09.2018</a:t>
+              <a:t>03.10.2018</a:t>
             </a:fld>
             <a:endParaRPr lang="de-DE"/>
           </a:p>
@@ -818,7 +818,7 @@
     </p:spTree>
     <p:extLst>
       <p:ext uri="{BB962C8B-B14F-4D97-AF65-F5344CB8AC3E}">
-        <p14:creationId xmlns:p14="http://schemas.microsoft.com/office/powerpoint/2010/main" xmlns="" val="815330753"/>
+        <p14:creationId xmlns="" xmlns:p14="http://schemas.microsoft.com/office/powerpoint/2010/main" val="815330753"/>
       </p:ext>
     </p:extLst>
   </p:cSld>
@@ -1012,7 +1012,7 @@
             <a:fld id="{B1816B0C-7247-44DD-BCB7-DAF5E546C78B}" type="datetimeFigureOut">
               <a:rPr lang="de-DE" smtClean="0"/>
               <a:pPr/>
-              <a:t>30.09.2018</a:t>
+              <a:t>03.10.2018</a:t>
             </a:fld>
             <a:endParaRPr lang="de-DE"/>
           </a:p>
@@ -1064,7 +1064,7 @@
     </p:spTree>
     <p:extLst>
       <p:ext uri="{BB962C8B-B14F-4D97-AF65-F5344CB8AC3E}">
-        <p14:creationId xmlns:p14="http://schemas.microsoft.com/office/powerpoint/2010/main" xmlns="" val="2365557286"/>
+        <p14:creationId xmlns="" xmlns:p14="http://schemas.microsoft.com/office/powerpoint/2010/main" val="2365557286"/>
       </p:ext>
     </p:extLst>
   </p:cSld>
@@ -1246,7 +1246,7 @@
             <a:fld id="{B1816B0C-7247-44DD-BCB7-DAF5E546C78B}" type="datetimeFigureOut">
               <a:rPr lang="de-DE" smtClean="0"/>
               <a:pPr/>
-              <a:t>30.09.2018</a:t>
+              <a:t>03.10.2018</a:t>
             </a:fld>
             <a:endParaRPr lang="de-DE"/>
           </a:p>
@@ -1298,7 +1298,7 @@
     </p:spTree>
     <p:extLst>
       <p:ext uri="{BB962C8B-B14F-4D97-AF65-F5344CB8AC3E}">
-        <p14:creationId xmlns:p14="http://schemas.microsoft.com/office/powerpoint/2010/main" xmlns="" val="1503624474"/>
+        <p14:creationId xmlns="" xmlns:p14="http://schemas.microsoft.com/office/powerpoint/2010/main" val="1503624474"/>
       </p:ext>
     </p:extLst>
   </p:cSld>
@@ -1615,7 +1615,7 @@
             <a:fld id="{B1816B0C-7247-44DD-BCB7-DAF5E546C78B}" type="datetimeFigureOut">
               <a:rPr lang="de-DE" smtClean="0"/>
               <a:pPr/>
-              <a:t>30.09.2018</a:t>
+              <a:t>03.10.2018</a:t>
             </a:fld>
             <a:endParaRPr lang="de-DE"/>
           </a:p>
@@ -1667,7 +1667,7 @@
     </p:spTree>
     <p:extLst>
       <p:ext uri="{BB962C8B-B14F-4D97-AF65-F5344CB8AC3E}">
-        <p14:creationId xmlns:p14="http://schemas.microsoft.com/office/powerpoint/2010/main" xmlns="" val="3505896177"/>
+        <p14:creationId xmlns="" xmlns:p14="http://schemas.microsoft.com/office/powerpoint/2010/main" val="3505896177"/>
       </p:ext>
     </p:extLst>
   </p:cSld>
@@ -1735,7 +1735,7 @@
             <a:fld id="{B1816B0C-7247-44DD-BCB7-DAF5E546C78B}" type="datetimeFigureOut">
               <a:rPr lang="de-DE" smtClean="0"/>
               <a:pPr/>
-              <a:t>30.09.2018</a:t>
+              <a:t>03.10.2018</a:t>
             </a:fld>
             <a:endParaRPr lang="de-DE"/>
           </a:p>
@@ -1787,7 +1787,7 @@
     </p:spTree>
     <p:extLst>
       <p:ext uri="{BB962C8B-B14F-4D97-AF65-F5344CB8AC3E}">
-        <p14:creationId xmlns:p14="http://schemas.microsoft.com/office/powerpoint/2010/main" xmlns="" val="704671550"/>
+        <p14:creationId xmlns="" xmlns:p14="http://schemas.microsoft.com/office/powerpoint/2010/main" val="704671550"/>
       </p:ext>
     </p:extLst>
   </p:cSld>
@@ -1832,7 +1832,7 @@
             <a:fld id="{B1816B0C-7247-44DD-BCB7-DAF5E546C78B}" type="datetimeFigureOut">
               <a:rPr lang="de-DE" smtClean="0"/>
               <a:pPr/>
-              <a:t>30.09.2018</a:t>
+              <a:t>03.10.2018</a:t>
             </a:fld>
             <a:endParaRPr lang="de-DE"/>
           </a:p>
@@ -1884,7 +1884,7 @@
     </p:spTree>
     <p:extLst>
       <p:ext uri="{BB962C8B-B14F-4D97-AF65-F5344CB8AC3E}">
-        <p14:creationId xmlns:p14="http://schemas.microsoft.com/office/powerpoint/2010/main" xmlns="" val="449122657"/>
+        <p14:creationId xmlns="" xmlns:p14="http://schemas.microsoft.com/office/powerpoint/2010/main" val="449122657"/>
       </p:ext>
     </p:extLst>
   </p:cSld>
@@ -2111,7 +2111,7 @@
             <a:fld id="{B1816B0C-7247-44DD-BCB7-DAF5E546C78B}" type="datetimeFigureOut">
               <a:rPr lang="de-DE" smtClean="0"/>
               <a:pPr/>
-              <a:t>30.09.2018</a:t>
+              <a:t>03.10.2018</a:t>
             </a:fld>
             <a:endParaRPr lang="de-DE"/>
           </a:p>
@@ -2163,7 +2163,7 @@
     </p:spTree>
     <p:extLst>
       <p:ext uri="{BB962C8B-B14F-4D97-AF65-F5344CB8AC3E}">
-        <p14:creationId xmlns:p14="http://schemas.microsoft.com/office/powerpoint/2010/main" xmlns="" val="2525634023"/>
+        <p14:creationId xmlns="" xmlns:p14="http://schemas.microsoft.com/office/powerpoint/2010/main" val="2525634023"/>
       </p:ext>
     </p:extLst>
   </p:cSld>
@@ -2370,7 +2370,7 @@
             <a:fld id="{B1816B0C-7247-44DD-BCB7-DAF5E546C78B}" type="datetimeFigureOut">
               <a:rPr lang="de-DE" smtClean="0"/>
               <a:pPr/>
-              <a:t>30.09.2018</a:t>
+              <a:t>03.10.2018</a:t>
             </a:fld>
             <a:endParaRPr lang="de-DE"/>
           </a:p>
@@ -2422,7 +2422,7 @@
     </p:spTree>
     <p:extLst>
       <p:ext uri="{BB962C8B-B14F-4D97-AF65-F5344CB8AC3E}">
-        <p14:creationId xmlns:p14="http://schemas.microsoft.com/office/powerpoint/2010/main" xmlns="" val="2050898295"/>
+        <p14:creationId xmlns="" xmlns:p14="http://schemas.microsoft.com/office/powerpoint/2010/main" val="2050898295"/>
       </p:ext>
     </p:extLst>
   </p:cSld>
@@ -2585,7 +2585,7 @@
             <a:fld id="{B1816B0C-7247-44DD-BCB7-DAF5E546C78B}" type="datetimeFigureOut">
               <a:rPr lang="de-DE" smtClean="0"/>
               <a:pPr/>
-              <a:t>30.09.2018</a:t>
+              <a:t>03.10.2018</a:t>
             </a:fld>
             <a:endParaRPr lang="de-DE"/>
           </a:p>
@@ -2673,7 +2673,7 @@
     </p:spTree>
     <p:extLst>
       <p:ext uri="{BB962C8B-B14F-4D97-AF65-F5344CB8AC3E}">
-        <p14:creationId xmlns:p14="http://schemas.microsoft.com/office/powerpoint/2010/main" xmlns="" val="872436980"/>
+        <p14:creationId xmlns="" xmlns:p14="http://schemas.microsoft.com/office/powerpoint/2010/main" val="872436980"/>
       </p:ext>
     </p:extLst>
   </p:cSld>
@@ -3036,51 +3036,6 @@
           </a:p>
         </p:txBody>
       </p:sp>
-      <p:sp>
-        <p:nvSpPr>
-          <p:cNvPr id="89" name="Rectangle 88"/>
-          <p:cNvSpPr/>
-          <p:nvPr/>
-        </p:nvSpPr>
-        <p:spPr>
-          <a:xfrm>
-            <a:off x="2343621" y="6166049"/>
-            <a:ext cx="1842054" cy="2615925"/>
-          </a:xfrm>
-          <a:prstGeom prst="rect">
-            <a:avLst/>
-          </a:prstGeom>
-          <a:solidFill>
-            <a:schemeClr val="accent1">
-              <a:alpha val="23000"/>
-            </a:schemeClr>
-          </a:solidFill>
-        </p:spPr>
-        <p:style>
-          <a:lnRef idx="2">
-            <a:schemeClr val="accent1">
-              <a:shade val="50000"/>
-            </a:schemeClr>
-          </a:lnRef>
-          <a:fillRef idx="1">
-            <a:schemeClr val="accent1"/>
-          </a:fillRef>
-          <a:effectRef idx="0">
-            <a:schemeClr val="accent1"/>
-          </a:effectRef>
-          <a:fontRef idx="minor">
-            <a:schemeClr val="lt1"/>
-          </a:fontRef>
-        </p:style>
-        <p:txBody>
-          <a:bodyPr lIns="91423" tIns="45712" rIns="91423" bIns="45712" rtlCol="0" anchor="ctr"/>
-          <a:lstStyle/>
-          <a:p>
-            <a:pPr algn="ctr"/>
-            <a:endParaRPr lang="de-DE" sz="1600" dirty="0"/>
-          </a:p>
-        </p:txBody>
-      </p:sp>
       <p:cxnSp>
         <p:nvCxnSpPr>
           <p:cNvPr id="92" name="Straight Connector 16"/>
@@ -3091,12 +3046,12 @@
         </p:nvCxnSpPr>
         <p:spPr>
           <a:xfrm rot="16200000" flipH="1" flipV="1">
-            <a:off x="2183255" y="3321596"/>
-            <a:ext cx="3176816" cy="2541116"/>
+            <a:off x="2524383" y="3032063"/>
+            <a:ext cx="2546153" cy="2489520"/>
           </a:xfrm>
           <a:prstGeom prst="bentConnector3">
             <a:avLst>
-              <a:gd name="adj1" fmla="val -7332"/>
+              <a:gd name="adj1" fmla="val -8978"/>
             </a:avLst>
           </a:prstGeom>
           <a:ln w="25400">
@@ -4075,21 +4030,680 @@
           </a:fontRef>
         </p:style>
       </p:cxnSp>
-      <p:sp>
-        <p:nvSpPr>
-          <p:cNvPr id="83" name="Cross 82"/>
+      <p:grpSp>
+        <p:nvGrpSpPr>
+          <p:cNvPr id="48" name="Group 47"/>
+          <p:cNvGrpSpPr/>
+          <p:nvPr/>
+        </p:nvGrpSpPr>
+        <p:grpSpPr>
+          <a:xfrm>
+            <a:off x="2356321" y="5556450"/>
+            <a:ext cx="1682279" cy="2389026"/>
+            <a:chOff x="2343621" y="6166049"/>
+            <a:chExt cx="1842054" cy="2615925"/>
+          </a:xfrm>
+        </p:grpSpPr>
+        <p:sp>
+          <p:nvSpPr>
+            <p:cNvPr id="89" name="Rectangle 88"/>
+            <p:cNvSpPr/>
+            <p:nvPr/>
+          </p:nvSpPr>
+          <p:spPr>
+            <a:xfrm>
+              <a:off x="2343621" y="6166049"/>
+              <a:ext cx="1842054" cy="2615925"/>
+            </a:xfrm>
+            <a:prstGeom prst="rect">
+              <a:avLst/>
+            </a:prstGeom>
+            <a:solidFill>
+              <a:schemeClr val="accent1">
+                <a:alpha val="23000"/>
+              </a:schemeClr>
+            </a:solidFill>
+          </p:spPr>
+          <p:style>
+            <a:lnRef idx="2">
+              <a:schemeClr val="accent1">
+                <a:shade val="50000"/>
+              </a:schemeClr>
+            </a:lnRef>
+            <a:fillRef idx="1">
+              <a:schemeClr val="accent1"/>
+            </a:fillRef>
+            <a:effectRef idx="0">
+              <a:schemeClr val="accent1"/>
+            </a:effectRef>
+            <a:fontRef idx="minor">
+              <a:schemeClr val="lt1"/>
+            </a:fontRef>
+          </p:style>
+          <p:txBody>
+            <a:bodyPr lIns="91423" tIns="45712" rIns="91423" bIns="45712" rtlCol="0" anchor="ctr"/>
+            <a:lstStyle/>
+            <a:p>
+              <a:pPr algn="ctr"/>
+              <a:endParaRPr lang="de-DE" sz="1600" dirty="0"/>
+            </a:p>
+          </p:txBody>
+        </p:sp>
+        <p:sp>
+          <p:nvSpPr>
+            <p:cNvPr id="83" name="Cross 82"/>
+            <p:cNvSpPr/>
+            <p:nvPr/>
+          </p:nvSpPr>
+          <p:spPr>
+            <a:xfrm>
+              <a:off x="2732604" y="8064011"/>
+              <a:ext cx="561542" cy="608337"/>
+            </a:xfrm>
+            <a:prstGeom prst="plus">
+              <a:avLst>
+                <a:gd name="adj" fmla="val 41892"/>
+              </a:avLst>
+            </a:prstGeom>
+          </p:spPr>
+          <p:style>
+            <a:lnRef idx="2">
+              <a:schemeClr val="accent1">
+                <a:shade val="50000"/>
+              </a:schemeClr>
+            </a:lnRef>
+            <a:fillRef idx="1">
+              <a:schemeClr val="accent1"/>
+            </a:fillRef>
+            <a:effectRef idx="0">
+              <a:schemeClr val="accent1"/>
+            </a:effectRef>
+            <a:fontRef idx="minor">
+              <a:schemeClr val="lt1"/>
+            </a:fontRef>
+          </p:style>
+          <p:txBody>
+            <a:bodyPr lIns="91423" tIns="45712" rIns="91423" bIns="45712" rtlCol="0" anchor="ctr"/>
+            <a:lstStyle/>
+            <a:p>
+              <a:pPr algn="ctr"/>
+              <a:endParaRPr lang="de-DE"/>
+            </a:p>
+          </p:txBody>
+        </p:sp>
+        <p:sp>
+          <p:nvSpPr>
+            <p:cNvPr id="84" name="Oval 83"/>
+            <p:cNvSpPr/>
+            <p:nvPr/>
+          </p:nvSpPr>
+          <p:spPr>
+            <a:xfrm>
+              <a:off x="3507979" y="8064011"/>
+              <a:ext cx="216568" cy="234615"/>
+            </a:xfrm>
+            <a:prstGeom prst="ellipse">
+              <a:avLst/>
+            </a:prstGeom>
+          </p:spPr>
+          <p:style>
+            <a:lnRef idx="2">
+              <a:schemeClr val="accent1">
+                <a:shade val="50000"/>
+              </a:schemeClr>
+            </a:lnRef>
+            <a:fillRef idx="1">
+              <a:schemeClr val="accent1"/>
+            </a:fillRef>
+            <a:effectRef idx="0">
+              <a:schemeClr val="accent1"/>
+            </a:effectRef>
+            <a:fontRef idx="minor">
+              <a:schemeClr val="lt1"/>
+            </a:fontRef>
+          </p:style>
+          <p:txBody>
+            <a:bodyPr lIns="91423" tIns="45712" rIns="91423" bIns="45712" rtlCol="0" anchor="ctr"/>
+            <a:lstStyle/>
+            <a:p>
+              <a:pPr algn="ctr"/>
+              <a:endParaRPr lang="de-DE"/>
+            </a:p>
+          </p:txBody>
+        </p:sp>
+        <p:sp>
+          <p:nvSpPr>
+            <p:cNvPr id="85" name="Oval 84"/>
+            <p:cNvSpPr/>
+            <p:nvPr/>
+          </p:nvSpPr>
+          <p:spPr>
+            <a:xfrm>
+              <a:off x="3509641" y="8453132"/>
+              <a:ext cx="216568" cy="234615"/>
+            </a:xfrm>
+            <a:prstGeom prst="ellipse">
+              <a:avLst/>
+            </a:prstGeom>
+          </p:spPr>
+          <p:style>
+            <a:lnRef idx="2">
+              <a:schemeClr val="accent1">
+                <a:shade val="50000"/>
+              </a:schemeClr>
+            </a:lnRef>
+            <a:fillRef idx="1">
+              <a:schemeClr val="accent1"/>
+            </a:fillRef>
+            <a:effectRef idx="0">
+              <a:schemeClr val="accent1"/>
+            </a:effectRef>
+            <a:fontRef idx="minor">
+              <a:schemeClr val="lt1"/>
+            </a:fontRef>
+          </p:style>
+          <p:txBody>
+            <a:bodyPr lIns="91423" tIns="45712" rIns="91423" bIns="45712" rtlCol="0" anchor="ctr"/>
+            <a:lstStyle/>
+            <a:p>
+              <a:pPr algn="ctr"/>
+              <a:endParaRPr lang="de-DE"/>
+            </a:p>
+          </p:txBody>
+        </p:sp>
+        <p:sp>
+          <p:nvSpPr>
+            <p:cNvPr id="88" name="Rectangle 87"/>
+            <p:cNvSpPr/>
+            <p:nvPr/>
+          </p:nvSpPr>
+          <p:spPr>
+            <a:xfrm>
+              <a:off x="2729548" y="7045189"/>
+              <a:ext cx="1102848" cy="856616"/>
+            </a:xfrm>
+            <a:prstGeom prst="rect">
+              <a:avLst/>
+            </a:prstGeom>
+          </p:spPr>
+          <p:style>
+            <a:lnRef idx="2">
+              <a:schemeClr val="accent1">
+                <a:shade val="50000"/>
+              </a:schemeClr>
+            </a:lnRef>
+            <a:fillRef idx="1">
+              <a:schemeClr val="accent1"/>
+            </a:fillRef>
+            <a:effectRef idx="0">
+              <a:schemeClr val="accent1"/>
+            </a:effectRef>
+            <a:fontRef idx="minor">
+              <a:schemeClr val="lt1"/>
+            </a:fontRef>
+          </p:style>
+          <p:txBody>
+            <a:bodyPr lIns="91423" tIns="45712" rIns="91423" bIns="45712" rtlCol="0" anchor="ctr"/>
+            <a:lstStyle/>
+            <a:p>
+              <a:pPr algn="ctr"/>
+              <a:r>
+                <a:rPr lang="de-DE" sz="1400" dirty="0" smtClean="0"/>
+                <a:t>CD4014</a:t>
+              </a:r>
+            </a:p>
+            <a:p>
+              <a:pPr algn="ctr"/>
+              <a:r>
+                <a:rPr lang="de-DE" sz="1400" dirty="0" smtClean="0"/>
+                <a:t>8-Stage </a:t>
+              </a:r>
+              <a:r>
+                <a:rPr lang="de-DE" sz="1400" dirty="0" err="1" smtClean="0"/>
+                <a:t>Shift</a:t>
+              </a:r>
+              <a:endParaRPr lang="de-DE" sz="1400" dirty="0" smtClean="0"/>
+            </a:p>
+            <a:p>
+              <a:pPr algn="ctr"/>
+              <a:r>
+                <a:rPr lang="de-DE" sz="1400" dirty="0" smtClean="0"/>
+                <a:t>Register</a:t>
+              </a:r>
+              <a:endParaRPr lang="de-DE" sz="1400" dirty="0"/>
+            </a:p>
+          </p:txBody>
+        </p:sp>
+        <p:sp>
+          <p:nvSpPr>
+            <p:cNvPr id="90" name="Rectangle 89"/>
+            <p:cNvSpPr/>
+            <p:nvPr/>
+          </p:nvSpPr>
+          <p:spPr>
+            <a:xfrm>
+              <a:off x="2463377" y="6320740"/>
+              <a:ext cx="1441963" cy="338538"/>
+            </a:xfrm>
+            <a:prstGeom prst="rect">
+              <a:avLst/>
+            </a:prstGeom>
+          </p:spPr>
+          <p:txBody>
+            <a:bodyPr wrap="none" lIns="91423" tIns="45712" rIns="91423" bIns="45712">
+              <a:spAutoFit/>
+            </a:bodyPr>
+            <a:lstStyle/>
+            <a:p>
+              <a:pPr algn="ctr"/>
+              <a:r>
+                <a:rPr lang="de-DE" sz="1600" dirty="0" smtClean="0"/>
+                <a:t>Display Control</a:t>
+              </a:r>
+              <a:endParaRPr lang="de-DE" sz="1600" dirty="0"/>
+            </a:p>
+          </p:txBody>
+        </p:sp>
+      </p:grpSp>
+      <p:cxnSp>
+        <p:nvCxnSpPr>
+          <p:cNvPr id="101" name="Straight Connector 100"/>
+          <p:cNvCxnSpPr/>
+          <p:nvPr/>
+        </p:nvCxnSpPr>
+        <p:spPr>
+          <a:xfrm>
+            <a:off x="4051300" y="6350000"/>
+            <a:ext cx="1282700" cy="12701"/>
+          </a:xfrm>
+          <a:prstGeom prst="line">
+            <a:avLst/>
+          </a:prstGeom>
+          <a:ln w="25400">
+            <a:solidFill>
+              <a:schemeClr val="tx1"/>
+            </a:solidFill>
+          </a:ln>
+        </p:spPr>
+        <p:style>
+          <a:lnRef idx="1">
+            <a:schemeClr val="accent1"/>
+          </a:lnRef>
+          <a:fillRef idx="0">
+            <a:schemeClr val="accent1"/>
+          </a:fillRef>
+          <a:effectRef idx="0">
+            <a:schemeClr val="accent1"/>
+          </a:effectRef>
+          <a:fontRef idx="minor">
+            <a:schemeClr val="tx1"/>
+          </a:fontRef>
+        </p:style>
+      </p:cxnSp>
+      <p:sp>
+        <p:nvSpPr>
+          <p:cNvPr id="34" name="TextBox 33"/>
+          <p:cNvSpPr txBox="1"/>
+          <p:nvPr/>
+        </p:nvSpPr>
+        <p:spPr>
+          <a:xfrm>
+            <a:off x="9207496" y="5373914"/>
+            <a:ext cx="919999" cy="307760"/>
+          </a:xfrm>
+          <a:prstGeom prst="rect">
+            <a:avLst/>
+          </a:prstGeom>
+          <a:noFill/>
+        </p:spPr>
+        <p:txBody>
+          <a:bodyPr wrap="square" lIns="91423" tIns="45712" rIns="91423" bIns="45712" rtlCol="0">
+            <a:spAutoFit/>
+          </a:bodyPr>
+          <a:lstStyle/>
+          <a:p>
+            <a:pPr algn="ctr"/>
+            <a:r>
+              <a:rPr lang="de-DE" sz="1400" dirty="0" smtClean="0">
+                <a:solidFill>
+                  <a:srgbClr val="FF0000"/>
+                </a:solidFill>
+              </a:rPr>
+              <a:t>60mW</a:t>
+            </a:r>
+            <a:endParaRPr lang="en-GB" sz="1400" dirty="0">
+              <a:solidFill>
+                <a:srgbClr val="FF0000"/>
+              </a:solidFill>
+            </a:endParaRPr>
+          </a:p>
+        </p:txBody>
+      </p:sp>
+      <p:sp>
+        <p:nvSpPr>
+          <p:cNvPr id="35" name="TextBox 34"/>
+          <p:cNvSpPr txBox="1"/>
+          <p:nvPr/>
+        </p:nvSpPr>
+        <p:spPr>
+          <a:xfrm>
+            <a:off x="10210799" y="6812643"/>
+            <a:ext cx="812801" cy="307760"/>
+          </a:xfrm>
+          <a:prstGeom prst="rect">
+            <a:avLst/>
+          </a:prstGeom>
+          <a:noFill/>
+        </p:spPr>
+        <p:txBody>
+          <a:bodyPr wrap="square" lIns="91423" tIns="45712" rIns="91423" bIns="45712" rtlCol="0">
+            <a:spAutoFit/>
+          </a:bodyPr>
+          <a:lstStyle/>
+          <a:p>
+            <a:pPr algn="ctr"/>
+            <a:r>
+              <a:rPr lang="de-DE" sz="1400" dirty="0" smtClean="0">
+                <a:solidFill>
+                  <a:srgbClr val="FF0000"/>
+                </a:solidFill>
+              </a:rPr>
+              <a:t>710mW</a:t>
+            </a:r>
+            <a:endParaRPr lang="en-GB" sz="1400" dirty="0">
+              <a:solidFill>
+                <a:srgbClr val="FF0000"/>
+              </a:solidFill>
+            </a:endParaRPr>
+          </a:p>
+        </p:txBody>
+      </p:sp>
+      <p:sp>
+        <p:nvSpPr>
+          <p:cNvPr id="61" name="TextBox 60"/>
+          <p:cNvSpPr txBox="1"/>
+          <p:nvPr/>
+        </p:nvSpPr>
+        <p:spPr>
+          <a:xfrm>
+            <a:off x="5622442" y="3060700"/>
+            <a:ext cx="1311758" cy="307760"/>
+          </a:xfrm>
+          <a:prstGeom prst="rect">
+            <a:avLst/>
+          </a:prstGeom>
+          <a:noFill/>
+        </p:spPr>
+        <p:txBody>
+          <a:bodyPr wrap="square" lIns="91423" tIns="45712" rIns="91423" bIns="45712" rtlCol="0">
+            <a:spAutoFit/>
+          </a:bodyPr>
+          <a:lstStyle/>
+          <a:p>
+            <a:pPr algn="ctr"/>
+            <a:r>
+              <a:rPr lang="de-DE" sz="1400" dirty="0" smtClean="0">
+                <a:solidFill>
+                  <a:srgbClr val="FF0000"/>
+                </a:solidFill>
+              </a:rPr>
+              <a:t>3.3W / 1.44w </a:t>
+            </a:r>
+            <a:endParaRPr lang="en-GB" sz="1400" dirty="0">
+              <a:solidFill>
+                <a:srgbClr val="FF0000"/>
+              </a:solidFill>
+            </a:endParaRPr>
+          </a:p>
+        </p:txBody>
+      </p:sp>
+      <p:sp>
+        <p:nvSpPr>
+          <p:cNvPr id="63" name="TextBox 62"/>
+          <p:cNvSpPr txBox="1"/>
+          <p:nvPr/>
+        </p:nvSpPr>
+        <p:spPr>
+          <a:xfrm>
+            <a:off x="7524504" y="5395886"/>
+            <a:ext cx="1200395" cy="338538"/>
+          </a:xfrm>
+          <a:prstGeom prst="rect">
+            <a:avLst/>
+          </a:prstGeom>
+          <a:noFill/>
+        </p:spPr>
+        <p:txBody>
+          <a:bodyPr wrap="square" lIns="91423" tIns="45712" rIns="91423" bIns="45712" rtlCol="0">
+            <a:spAutoFit/>
+          </a:bodyPr>
+          <a:lstStyle/>
+          <a:p>
+            <a:pPr algn="ctr"/>
+            <a:r>
+              <a:rPr lang="de-DE" sz="1600" dirty="0" smtClean="0">
+                <a:solidFill>
+                  <a:srgbClr val="FF0000"/>
+                </a:solidFill>
+              </a:rPr>
+              <a:t>2mW</a:t>
+            </a:r>
+            <a:endParaRPr lang="en-GB" sz="1600" dirty="0">
+              <a:solidFill>
+                <a:srgbClr val="FF0000"/>
+              </a:solidFill>
+            </a:endParaRPr>
+          </a:p>
+        </p:txBody>
+      </p:sp>
+      <p:cxnSp>
+        <p:nvCxnSpPr>
+          <p:cNvPr id="64" name="Straight Connector 16"/>
+          <p:cNvCxnSpPr/>
+          <p:nvPr/>
+        </p:nvCxnSpPr>
+        <p:spPr>
+          <a:xfrm rot="5400000">
+            <a:off x="7204698" y="4562925"/>
+            <a:ext cx="2397333" cy="161266"/>
+          </a:xfrm>
+          <a:prstGeom prst="bentConnector3">
+            <a:avLst>
+              <a:gd name="adj1" fmla="val 99393"/>
+            </a:avLst>
+          </a:prstGeom>
+          <a:ln w="25400">
+            <a:solidFill>
+              <a:schemeClr val="tx1"/>
+            </a:solidFill>
+            <a:headEnd type="oval"/>
+            <a:tailEnd type="none"/>
+          </a:ln>
+        </p:spPr>
+        <p:style>
+          <a:lnRef idx="1">
+            <a:schemeClr val="accent1"/>
+          </a:lnRef>
+          <a:fillRef idx="0">
+            <a:schemeClr val="accent1"/>
+          </a:fillRef>
+          <a:effectRef idx="0">
+            <a:schemeClr val="accent1"/>
+          </a:effectRef>
+          <a:fontRef idx="minor">
+            <a:schemeClr val="tx1"/>
+          </a:fontRef>
+        </p:style>
+      </p:cxnSp>
+      <p:sp>
+        <p:nvSpPr>
+          <p:cNvPr id="71" name="TextBox 70"/>
+          <p:cNvSpPr txBox="1"/>
+          <p:nvPr/>
+        </p:nvSpPr>
+        <p:spPr>
+          <a:xfrm>
+            <a:off x="4922353" y="2727428"/>
+            <a:ext cx="962509" cy="307760"/>
+          </a:xfrm>
+          <a:prstGeom prst="rect">
+            <a:avLst/>
+          </a:prstGeom>
+          <a:noFill/>
+        </p:spPr>
+        <p:txBody>
+          <a:bodyPr wrap="square" lIns="91423" tIns="45712" rIns="91423" bIns="45712" rtlCol="0">
+            <a:spAutoFit/>
+          </a:bodyPr>
+          <a:lstStyle/>
+          <a:p>
+            <a:pPr algn="ctr"/>
+            <a:r>
+              <a:rPr lang="de-DE" sz="1400" dirty="0" smtClean="0">
+                <a:solidFill>
+                  <a:srgbClr val="3333FF"/>
+                </a:solidFill>
+              </a:rPr>
+              <a:t>Vd=1.2V</a:t>
+            </a:r>
+            <a:endParaRPr lang="en-GB" sz="1400" dirty="0">
+              <a:solidFill>
+                <a:srgbClr val="3333FF"/>
+              </a:solidFill>
+            </a:endParaRPr>
+          </a:p>
+        </p:txBody>
+      </p:sp>
+      <p:sp>
+        <p:nvSpPr>
+          <p:cNvPr id="72" name="TextBox 71"/>
+          <p:cNvSpPr txBox="1"/>
+          <p:nvPr/>
+        </p:nvSpPr>
+        <p:spPr>
+          <a:xfrm>
+            <a:off x="4746626" y="4032354"/>
+            <a:ext cx="1073345" cy="307760"/>
+          </a:xfrm>
+          <a:prstGeom prst="rect">
+            <a:avLst/>
+          </a:prstGeom>
+          <a:noFill/>
+        </p:spPr>
+        <p:txBody>
+          <a:bodyPr wrap="square" lIns="91423" tIns="45712" rIns="91423" bIns="45712" rtlCol="0">
+            <a:spAutoFit/>
+          </a:bodyPr>
+          <a:lstStyle/>
+          <a:p>
+            <a:pPr algn="ctr"/>
+            <a:r>
+              <a:rPr lang="de-DE" sz="1400" dirty="0" smtClean="0">
+                <a:solidFill>
+                  <a:srgbClr val="3333FF"/>
+                </a:solidFill>
+              </a:rPr>
+              <a:t>Vd=120mV</a:t>
+            </a:r>
+            <a:endParaRPr lang="en-GB" sz="1400" dirty="0">
+              <a:solidFill>
+                <a:srgbClr val="3333FF"/>
+              </a:solidFill>
+            </a:endParaRPr>
+          </a:p>
+        </p:txBody>
+      </p:sp>
+      <p:sp>
+        <p:nvSpPr>
+          <p:cNvPr id="76" name="TextBox 75"/>
+          <p:cNvSpPr txBox="1"/>
+          <p:nvPr/>
+        </p:nvSpPr>
+        <p:spPr>
+          <a:xfrm>
+            <a:off x="3974615" y="2722665"/>
+            <a:ext cx="843447" cy="307760"/>
+          </a:xfrm>
+          <a:prstGeom prst="rect">
+            <a:avLst/>
+          </a:prstGeom>
+          <a:noFill/>
+        </p:spPr>
+        <p:txBody>
+          <a:bodyPr wrap="square" lIns="91423" tIns="45712" rIns="91423" bIns="45712" rtlCol="0">
+            <a:spAutoFit/>
+          </a:bodyPr>
+          <a:lstStyle/>
+          <a:p>
+            <a:pPr algn="ctr"/>
+            <a:r>
+              <a:rPr lang="de-DE" sz="1400" dirty="0" smtClean="0">
+                <a:solidFill>
+                  <a:srgbClr val="3333FF"/>
+                </a:solidFill>
+              </a:rPr>
+              <a:t>Vi&gt;4.5V</a:t>
+            </a:r>
+            <a:endParaRPr lang="en-GB" sz="1400" dirty="0">
+              <a:solidFill>
+                <a:srgbClr val="3333FF"/>
+              </a:solidFill>
+            </a:endParaRPr>
+          </a:p>
+        </p:txBody>
+      </p:sp>
+      <p:sp>
+        <p:nvSpPr>
+          <p:cNvPr id="95" name="TextBox 94"/>
+          <p:cNvSpPr txBox="1"/>
+          <p:nvPr/>
+        </p:nvSpPr>
+        <p:spPr>
+          <a:xfrm>
+            <a:off x="1496786" y="3091543"/>
+            <a:ext cx="948602" cy="307760"/>
+          </a:xfrm>
+          <a:prstGeom prst="rect">
+            <a:avLst/>
+          </a:prstGeom>
+          <a:noFill/>
+        </p:spPr>
+        <p:txBody>
+          <a:bodyPr wrap="square" lIns="91423" tIns="45712" rIns="91423" bIns="45712" rtlCol="0">
+            <a:spAutoFit/>
+          </a:bodyPr>
+          <a:lstStyle/>
+          <a:p>
+            <a:pPr algn="ctr"/>
+            <a:r>
+              <a:rPr lang="de-DE" sz="1400" dirty="0" smtClean="0">
+                <a:solidFill>
+                  <a:srgbClr val="00B050"/>
+                </a:solidFill>
+              </a:rPr>
+              <a:t>450mA</a:t>
+            </a:r>
+            <a:endParaRPr lang="en-GB" sz="1400" dirty="0">
+              <a:solidFill>
+                <a:srgbClr val="00B050"/>
+              </a:solidFill>
+            </a:endParaRPr>
+          </a:p>
+        </p:txBody>
+      </p:sp>
+      <p:sp>
+        <p:nvSpPr>
+          <p:cNvPr id="52" name="Rectangle 51"/>
           <p:cNvSpPr/>
           <p:nvPr/>
         </p:nvSpPr>
         <p:spPr>
           <a:xfrm>
-            <a:off x="2732604" y="8064011"/>
-            <a:ext cx="561542" cy="608337"/>
-          </a:xfrm>
-          <a:prstGeom prst="plus">
-            <a:avLst>
-              <a:gd name="adj" fmla="val 41892"/>
-            </a:avLst>
+            <a:off x="11431856" y="8353256"/>
+            <a:ext cx="1102848" cy="856616"/>
+          </a:xfrm>
+          <a:prstGeom prst="rect">
+            <a:avLst/>
           </a:prstGeom>
         </p:spPr>
         <p:style>
@@ -4113,22 +4727,149 @@
           <a:lstStyle/>
           <a:p>
             <a:pPr algn="ctr"/>
-            <a:endParaRPr lang="de-DE"/>
-          </a:p>
-        </p:txBody>
-      </p:sp>
-      <p:sp>
-        <p:nvSpPr>
-          <p:cNvPr id="84" name="Oval 83"/>
+            <a:r>
+              <a:rPr lang="de-DE" sz="1200" dirty="0" smtClean="0"/>
+              <a:t>Memory</a:t>
+            </a:r>
+          </a:p>
+          <a:p>
+            <a:pPr algn="ctr"/>
+            <a:r>
+              <a:rPr lang="de-DE" sz="1200" dirty="0" smtClean="0"/>
+              <a:t>Imax=200mA</a:t>
+            </a:r>
+            <a:endParaRPr lang="de-DE" sz="1200" dirty="0"/>
+          </a:p>
+        </p:txBody>
+      </p:sp>
+      <p:cxnSp>
+        <p:nvCxnSpPr>
+          <p:cNvPr id="104" name="Straight Connector 16"/>
+          <p:cNvCxnSpPr>
+            <a:stCxn id="58" idx="0"/>
+          </p:cNvCxnSpPr>
+          <p:nvPr/>
+        </p:nvCxnSpPr>
+        <p:spPr>
+          <a:xfrm rot="16200000" flipV="1">
+            <a:off x="8240008" y="4548897"/>
+            <a:ext cx="2266428" cy="26637"/>
+          </a:xfrm>
+          <a:prstGeom prst="straightConnector1">
+            <a:avLst/>
+          </a:prstGeom>
+          <a:ln w="25400">
+            <a:solidFill>
+              <a:schemeClr val="tx1"/>
+            </a:solidFill>
+            <a:tailEnd type="oval"/>
+          </a:ln>
+        </p:spPr>
+        <p:style>
+          <a:lnRef idx="1">
+            <a:schemeClr val="accent1"/>
+          </a:lnRef>
+          <a:fillRef idx="0">
+            <a:schemeClr val="accent1"/>
+          </a:fillRef>
+          <a:effectRef idx="0">
+            <a:schemeClr val="accent1"/>
+          </a:effectRef>
+          <a:fontRef idx="minor">
+            <a:schemeClr val="tx1"/>
+          </a:fontRef>
+        </p:style>
+      </p:cxnSp>
+      <p:sp>
+        <p:nvSpPr>
+          <p:cNvPr id="108" name="TextBox 107"/>
+          <p:cNvSpPr txBox="1"/>
+          <p:nvPr/>
+        </p:nvSpPr>
+        <p:spPr>
+          <a:xfrm>
+            <a:off x="5622442" y="3492500"/>
+            <a:ext cx="1311758" cy="307760"/>
+          </a:xfrm>
+          <a:prstGeom prst="rect">
+            <a:avLst/>
+          </a:prstGeom>
+          <a:noFill/>
+        </p:spPr>
+        <p:txBody>
+          <a:bodyPr wrap="square" lIns="91423" tIns="45712" rIns="91423" bIns="45712" rtlCol="0">
+            <a:spAutoFit/>
+          </a:bodyPr>
+          <a:lstStyle/>
+          <a:p>
+            <a:pPr algn="ctr"/>
+            <a:r>
+              <a:rPr lang="de-DE" sz="1400" dirty="0" smtClean="0">
+                <a:solidFill>
+                  <a:srgbClr val="00B050"/>
+                </a:solidFill>
+              </a:rPr>
+              <a:t>1A / 450mA </a:t>
+            </a:r>
+            <a:endParaRPr lang="en-GB" sz="1400" dirty="0">
+              <a:solidFill>
+                <a:srgbClr val="00B050"/>
+              </a:solidFill>
+            </a:endParaRPr>
+          </a:p>
+        </p:txBody>
+      </p:sp>
+      <p:sp>
+        <p:nvSpPr>
+          <p:cNvPr id="111" name="TextBox 110"/>
+          <p:cNvSpPr txBox="1"/>
+          <p:nvPr/>
+        </p:nvSpPr>
+        <p:spPr>
+          <a:xfrm>
+            <a:off x="4292115" y="4589565"/>
+            <a:ext cx="843447" cy="307760"/>
+          </a:xfrm>
+          <a:prstGeom prst="rect">
+            <a:avLst/>
+          </a:prstGeom>
+          <a:noFill/>
+        </p:spPr>
+        <p:txBody>
+          <a:bodyPr wrap="square" lIns="91423" tIns="45712" rIns="91423" bIns="45712" rtlCol="0">
+            <a:spAutoFit/>
+          </a:bodyPr>
+          <a:lstStyle/>
+          <a:p>
+            <a:pPr algn="ctr"/>
+            <a:r>
+              <a:rPr lang="de-DE" sz="1400" dirty="0" smtClean="0">
+                <a:solidFill>
+                  <a:srgbClr val="3333FF"/>
+                </a:solidFill>
+              </a:rPr>
+              <a:t>Vi=5V</a:t>
+            </a:r>
+            <a:endParaRPr lang="en-GB" sz="1400" dirty="0">
+              <a:solidFill>
+                <a:srgbClr val="3333FF"/>
+              </a:solidFill>
+            </a:endParaRPr>
+          </a:p>
+        </p:txBody>
+      </p:sp>
+      <p:sp>
+        <p:nvSpPr>
+          <p:cNvPr id="50" name="Rectangle 49"/>
           <p:cNvSpPr/>
           <p:nvPr/>
         </p:nvSpPr>
         <p:spPr>
           <a:xfrm>
-            <a:off x="3507979" y="8064011"/>
-            <a:ext cx="216568" cy="234615"/>
-          </a:xfrm>
-          <a:prstGeom prst="ellipse">
+            <a:off x="11431856" y="7314228"/>
+            <a:ext cx="1102848" cy="623272"/>
+          </a:xfrm>
+          <a:prstGeom prst="rect">
             <a:avLst/>
           </a:prstGeom>
         </p:spPr>
@@ -4153,22 +4894,72 @@
           <a:lstStyle/>
           <a:p>
             <a:pPr algn="ctr"/>
-            <a:endParaRPr lang="de-DE"/>
-          </a:p>
-        </p:txBody>
-      </p:sp>
-      <p:sp>
-        <p:nvSpPr>
-          <p:cNvPr id="85" name="Oval 84"/>
+            <a:r>
+              <a:rPr lang="de-DE" sz="1200" dirty="0" smtClean="0"/>
+              <a:t>Buffer</a:t>
+            </a:r>
+          </a:p>
+          <a:p>
+            <a:pPr algn="ctr"/>
+            <a:r>
+              <a:rPr lang="en-GB" sz="1200" dirty="0" smtClean="0"/>
+              <a:t>SN74LVC125A</a:t>
+            </a:r>
+            <a:endParaRPr lang="de-DE" sz="1200" dirty="0"/>
+          </a:p>
+        </p:txBody>
+      </p:sp>
+      <p:sp>
+        <p:nvSpPr>
+          <p:cNvPr id="36" name="TextBox 35"/>
+          <p:cNvSpPr txBox="1"/>
+          <p:nvPr/>
+        </p:nvSpPr>
+        <p:spPr>
+          <a:xfrm>
+            <a:off x="11884042" y="6959600"/>
+            <a:ext cx="866758" cy="307760"/>
+          </a:xfrm>
+          <a:prstGeom prst="rect">
+            <a:avLst/>
+          </a:prstGeom>
+          <a:noFill/>
+        </p:spPr>
+        <p:txBody>
+          <a:bodyPr wrap="square" lIns="91423" tIns="45712" rIns="91423" bIns="45712" rtlCol="0">
+            <a:spAutoFit/>
+          </a:bodyPr>
+          <a:lstStyle/>
+          <a:p>
+            <a:pPr algn="ctr"/>
+            <a:r>
+              <a:rPr lang="de-DE" sz="1400" dirty="0" smtClean="0">
+                <a:solidFill>
+                  <a:srgbClr val="FF0000"/>
+                </a:solidFill>
+              </a:rPr>
+              <a:t>660mW</a:t>
+            </a:r>
+            <a:endParaRPr lang="en-GB" sz="1400" dirty="0">
+              <a:solidFill>
+                <a:srgbClr val="FF0000"/>
+              </a:solidFill>
+            </a:endParaRPr>
+          </a:p>
+        </p:txBody>
+      </p:sp>
+      <p:sp>
+        <p:nvSpPr>
+          <p:cNvPr id="66" name="Rectangle 65"/>
           <p:cNvSpPr/>
           <p:nvPr/>
         </p:nvSpPr>
         <p:spPr>
           <a:xfrm>
-            <a:off x="3509641" y="8453132"/>
-            <a:ext cx="216568" cy="234615"/>
-          </a:xfrm>
-          <a:prstGeom prst="ellipse">
+            <a:off x="448174" y="6359336"/>
+            <a:ext cx="1007190" cy="782315"/>
+          </a:xfrm>
+          <a:prstGeom prst="rect">
             <a:avLst/>
           </a:prstGeom>
         </p:spPr>
@@ -4193,20 +4984,106 @@
           <a:lstStyle/>
           <a:p>
             <a:pPr algn="ctr"/>
-            <a:endParaRPr lang="de-DE"/>
-          </a:p>
-        </p:txBody>
-      </p:sp>
-      <p:sp>
-        <p:nvSpPr>
-          <p:cNvPr id="88" name="Rectangle 87"/>
+            <a:r>
+              <a:rPr lang="de-DE" sz="1400" dirty="0" smtClean="0"/>
+              <a:t>CH340G</a:t>
+            </a:r>
+          </a:p>
+          <a:p>
+            <a:pPr algn="ctr"/>
+            <a:r>
+              <a:rPr lang="de-DE" sz="1400" dirty="0" smtClean="0"/>
+              <a:t>USB to UART</a:t>
+            </a:r>
+            <a:endParaRPr lang="de-DE" sz="1400" dirty="0"/>
+          </a:p>
+        </p:txBody>
+      </p:sp>
+      <p:cxnSp>
+        <p:nvCxnSpPr>
+          <p:cNvPr id="70" name="Straight Connector 69"/>
+          <p:cNvCxnSpPr>
+            <a:stCxn id="13" idx="2"/>
+            <a:endCxn id="66" idx="0"/>
+          </p:cNvCxnSpPr>
+          <p:nvPr/>
+        </p:nvCxnSpPr>
+        <p:spPr>
+          <a:xfrm rot="16200000" flipH="1">
+            <a:off x="-302312" y="5105254"/>
+            <a:ext cx="2498973" cy="9190"/>
+          </a:xfrm>
+          <a:prstGeom prst="line">
+            <a:avLst/>
+          </a:prstGeom>
+          <a:ln w="25400">
+            <a:solidFill>
+              <a:schemeClr val="tx1"/>
+            </a:solidFill>
+          </a:ln>
+        </p:spPr>
+        <p:style>
+          <a:lnRef idx="1">
+            <a:schemeClr val="accent1"/>
+          </a:lnRef>
+          <a:fillRef idx="0">
+            <a:schemeClr val="accent1"/>
+          </a:fillRef>
+          <a:effectRef idx="0">
+            <a:schemeClr val="accent1"/>
+          </a:effectRef>
+          <a:fontRef idx="minor">
+            <a:schemeClr val="tx1"/>
+          </a:fontRef>
+        </p:style>
+      </p:cxnSp>
+      <p:cxnSp>
+        <p:nvCxnSpPr>
+          <p:cNvPr id="80" name="Straight Connector 79"/>
+          <p:cNvCxnSpPr>
+            <a:stCxn id="66" idx="2"/>
+          </p:cNvCxnSpPr>
+          <p:nvPr/>
+        </p:nvCxnSpPr>
+        <p:spPr>
+          <a:xfrm rot="16200000" flipH="1">
+            <a:off x="2459210" y="5634210"/>
+            <a:ext cx="1367352" cy="4382234"/>
+          </a:xfrm>
+          <a:prstGeom prst="bentConnector2">
+            <a:avLst/>
+          </a:prstGeom>
+          <a:ln w="25400">
+            <a:solidFill>
+              <a:schemeClr val="tx1"/>
+            </a:solidFill>
+          </a:ln>
+        </p:spPr>
+        <p:style>
+          <a:lnRef idx="1">
+            <a:schemeClr val="accent1"/>
+          </a:lnRef>
+          <a:fillRef idx="0">
+            <a:schemeClr val="accent1"/>
+          </a:fillRef>
+          <a:effectRef idx="0">
+            <a:schemeClr val="accent1"/>
+          </a:effectRef>
+          <a:fontRef idx="minor">
+            <a:schemeClr val="tx1"/>
+          </a:fontRef>
+        </p:style>
+      </p:cxnSp>
+      <p:sp>
+        <p:nvSpPr>
+          <p:cNvPr id="91" name="Rectangle 90"/>
           <p:cNvSpPr/>
           <p:nvPr/>
         </p:nvSpPr>
         <p:spPr>
           <a:xfrm>
-            <a:off x="2729548" y="7045189"/>
-            <a:ext cx="1102848" cy="856616"/>
+            <a:off x="448174" y="7451533"/>
+            <a:ext cx="1007190" cy="782315"/>
           </a:xfrm>
           <a:prstGeom prst="rect">
             <a:avLst/>
@@ -4234,27 +5111,22 @@
           <a:p>
             <a:pPr algn="ctr"/>
             <a:r>
+              <a:rPr lang="en-GB" sz="1400" dirty="0" smtClean="0"/>
+              <a:t>PCA9306</a:t>
+            </a:r>
+          </a:p>
+          <a:p>
+            <a:pPr algn="ctr"/>
+            <a:r>
               <a:rPr lang="de-DE" sz="1400" dirty="0" smtClean="0"/>
-              <a:t>CD4014</a:t>
+              <a:t>Level</a:t>
             </a:r>
           </a:p>
           <a:p>
             <a:pPr algn="ctr"/>
             <a:r>
               <a:rPr lang="de-DE" sz="1400" dirty="0" smtClean="0"/>
-              <a:t>8-Stage </a:t>
-            </a:r>
-            <a:r>
-              <a:rPr lang="de-DE" sz="1400" dirty="0" err="1" smtClean="0"/>
-              <a:t>Shift</a:t>
-            </a:r>
-            <a:endParaRPr lang="de-DE" sz="1400" dirty="0" smtClean="0"/>
-          </a:p>
-          <a:p>
-            <a:pPr algn="ctr"/>
-            <a:r>
-              <a:rPr lang="de-DE" sz="1400" dirty="0" smtClean="0"/>
-              <a:t>Register</a:t>
+              <a:t>Shifter</a:t>
             </a:r>
             <a:endParaRPr lang="de-DE" sz="1400" dirty="0"/>
           </a:p>
@@ -4262,430 +5134,14 @@
       </p:sp>
       <p:sp>
         <p:nvSpPr>
-          <p:cNvPr id="90" name="Rectangle 89"/>
+          <p:cNvPr id="93" name="Rectangle 92"/>
           <p:cNvSpPr/>
           <p:nvPr/>
         </p:nvSpPr>
         <p:spPr>
           <a:xfrm>
-            <a:off x="2463377" y="6320740"/>
-            <a:ext cx="1441963" cy="338538"/>
-          </a:xfrm>
-          <a:prstGeom prst="rect">
-            <a:avLst/>
-          </a:prstGeom>
-        </p:spPr>
-        <p:txBody>
-          <a:bodyPr wrap="none" lIns="91423" tIns="45712" rIns="91423" bIns="45712">
-            <a:spAutoFit/>
-          </a:bodyPr>
-          <a:lstStyle/>
-          <a:p>
-            <a:pPr algn="ctr"/>
-            <a:r>
-              <a:rPr lang="de-DE" sz="1600" dirty="0" smtClean="0"/>
-              <a:t>Display Control</a:t>
-            </a:r>
-            <a:endParaRPr lang="de-DE" sz="1600" dirty="0"/>
-          </a:p>
-        </p:txBody>
-      </p:sp>
-      <p:cxnSp>
-        <p:nvCxnSpPr>
-          <p:cNvPr id="101" name="Straight Connector 100"/>
-          <p:cNvCxnSpPr/>
-          <p:nvPr/>
-        </p:nvCxnSpPr>
-        <p:spPr>
-          <a:xfrm>
-            <a:off x="4200191" y="6802982"/>
-            <a:ext cx="1102848" cy="0"/>
-          </a:xfrm>
-          <a:prstGeom prst="line">
-            <a:avLst/>
-          </a:prstGeom>
-          <a:ln w="25400">
-            <a:solidFill>
-              <a:schemeClr val="tx1"/>
-            </a:solidFill>
-          </a:ln>
-        </p:spPr>
-        <p:style>
-          <a:lnRef idx="1">
-            <a:schemeClr val="accent1"/>
-          </a:lnRef>
-          <a:fillRef idx="0">
-            <a:schemeClr val="accent1"/>
-          </a:fillRef>
-          <a:effectRef idx="0">
-            <a:schemeClr val="accent1"/>
-          </a:effectRef>
-          <a:fontRef idx="minor">
-            <a:schemeClr val="tx1"/>
-          </a:fontRef>
-        </p:style>
-      </p:cxnSp>
-      <p:sp>
-        <p:nvSpPr>
-          <p:cNvPr id="34" name="TextBox 33"/>
-          <p:cNvSpPr txBox="1"/>
-          <p:nvPr/>
-        </p:nvSpPr>
-        <p:spPr>
-          <a:xfrm>
-            <a:off x="9207496" y="5373914"/>
-            <a:ext cx="919999" cy="307760"/>
-          </a:xfrm>
-          <a:prstGeom prst="rect">
-            <a:avLst/>
-          </a:prstGeom>
-          <a:noFill/>
-        </p:spPr>
-        <p:txBody>
-          <a:bodyPr wrap="square" lIns="91423" tIns="45712" rIns="91423" bIns="45712" rtlCol="0">
-            <a:spAutoFit/>
-          </a:bodyPr>
-          <a:lstStyle/>
-          <a:p>
-            <a:pPr algn="ctr"/>
-            <a:r>
-              <a:rPr lang="de-DE" sz="1400" dirty="0" smtClean="0">
-                <a:solidFill>
-                  <a:srgbClr val="FF0000"/>
-                </a:solidFill>
-              </a:rPr>
-              <a:t>60mW</a:t>
-            </a:r>
-            <a:endParaRPr lang="en-GB" sz="1400" dirty="0">
-              <a:solidFill>
-                <a:srgbClr val="FF0000"/>
-              </a:solidFill>
-            </a:endParaRPr>
-          </a:p>
-        </p:txBody>
-      </p:sp>
-      <p:sp>
-        <p:nvSpPr>
-          <p:cNvPr id="35" name="TextBox 34"/>
-          <p:cNvSpPr txBox="1"/>
-          <p:nvPr/>
-        </p:nvSpPr>
-        <p:spPr>
-          <a:xfrm>
-            <a:off x="10210799" y="6812643"/>
-            <a:ext cx="812801" cy="307760"/>
-          </a:xfrm>
-          <a:prstGeom prst="rect">
-            <a:avLst/>
-          </a:prstGeom>
-          <a:noFill/>
-        </p:spPr>
-        <p:txBody>
-          <a:bodyPr wrap="square" lIns="91423" tIns="45712" rIns="91423" bIns="45712" rtlCol="0">
-            <a:spAutoFit/>
-          </a:bodyPr>
-          <a:lstStyle/>
-          <a:p>
-            <a:pPr algn="ctr"/>
-            <a:r>
-              <a:rPr lang="de-DE" sz="1400" dirty="0" smtClean="0">
-                <a:solidFill>
-                  <a:srgbClr val="FF0000"/>
-                </a:solidFill>
-              </a:rPr>
-              <a:t>710mW</a:t>
-            </a:r>
-            <a:endParaRPr lang="en-GB" sz="1400" dirty="0">
-              <a:solidFill>
-                <a:srgbClr val="FF0000"/>
-              </a:solidFill>
-            </a:endParaRPr>
-          </a:p>
-        </p:txBody>
-      </p:sp>
-      <p:sp>
-        <p:nvSpPr>
-          <p:cNvPr id="61" name="TextBox 60"/>
-          <p:cNvSpPr txBox="1"/>
-          <p:nvPr/>
-        </p:nvSpPr>
-        <p:spPr>
-          <a:xfrm>
-            <a:off x="5622442" y="3060700"/>
-            <a:ext cx="1311758" cy="307760"/>
-          </a:xfrm>
-          <a:prstGeom prst="rect">
-            <a:avLst/>
-          </a:prstGeom>
-          <a:noFill/>
-        </p:spPr>
-        <p:txBody>
-          <a:bodyPr wrap="square" lIns="91423" tIns="45712" rIns="91423" bIns="45712" rtlCol="0">
-            <a:spAutoFit/>
-          </a:bodyPr>
-          <a:lstStyle/>
-          <a:p>
-            <a:pPr algn="ctr"/>
-            <a:r>
-              <a:rPr lang="de-DE" sz="1400" dirty="0" smtClean="0">
-                <a:solidFill>
-                  <a:srgbClr val="FF0000"/>
-                </a:solidFill>
-              </a:rPr>
-              <a:t>3.3W / 1.44w </a:t>
-            </a:r>
-            <a:endParaRPr lang="en-GB" sz="1400" dirty="0">
-              <a:solidFill>
-                <a:srgbClr val="FF0000"/>
-              </a:solidFill>
-            </a:endParaRPr>
-          </a:p>
-        </p:txBody>
-      </p:sp>
-      <p:sp>
-        <p:nvSpPr>
-          <p:cNvPr id="63" name="TextBox 62"/>
-          <p:cNvSpPr txBox="1"/>
-          <p:nvPr/>
-        </p:nvSpPr>
-        <p:spPr>
-          <a:xfrm>
-            <a:off x="7524504" y="5395886"/>
-            <a:ext cx="1200395" cy="338538"/>
-          </a:xfrm>
-          <a:prstGeom prst="rect">
-            <a:avLst/>
-          </a:prstGeom>
-          <a:noFill/>
-        </p:spPr>
-        <p:txBody>
-          <a:bodyPr wrap="square" lIns="91423" tIns="45712" rIns="91423" bIns="45712" rtlCol="0">
-            <a:spAutoFit/>
-          </a:bodyPr>
-          <a:lstStyle/>
-          <a:p>
-            <a:pPr algn="ctr"/>
-            <a:r>
-              <a:rPr lang="de-DE" sz="1600" dirty="0" smtClean="0">
-                <a:solidFill>
-                  <a:srgbClr val="FF0000"/>
-                </a:solidFill>
-              </a:rPr>
-              <a:t>2mW</a:t>
-            </a:r>
-            <a:endParaRPr lang="en-GB" sz="1600" dirty="0">
-              <a:solidFill>
-                <a:srgbClr val="FF0000"/>
-              </a:solidFill>
-            </a:endParaRPr>
-          </a:p>
-        </p:txBody>
-      </p:sp>
-      <p:cxnSp>
-        <p:nvCxnSpPr>
-          <p:cNvPr id="64" name="Straight Connector 16"/>
-          <p:cNvCxnSpPr/>
-          <p:nvPr/>
-        </p:nvCxnSpPr>
-        <p:spPr>
-          <a:xfrm rot="5400000">
-            <a:off x="7204698" y="4562925"/>
-            <a:ext cx="2397333" cy="161266"/>
-          </a:xfrm>
-          <a:prstGeom prst="bentConnector3">
-            <a:avLst>
-              <a:gd name="adj1" fmla="val 99393"/>
-            </a:avLst>
-          </a:prstGeom>
-          <a:ln w="25400">
-            <a:solidFill>
-              <a:schemeClr val="tx1"/>
-            </a:solidFill>
-            <a:headEnd type="oval"/>
-            <a:tailEnd type="none"/>
-          </a:ln>
-        </p:spPr>
-        <p:style>
-          <a:lnRef idx="1">
-            <a:schemeClr val="accent1"/>
-          </a:lnRef>
-          <a:fillRef idx="0">
-            <a:schemeClr val="accent1"/>
-          </a:fillRef>
-          <a:effectRef idx="0">
-            <a:schemeClr val="accent1"/>
-          </a:effectRef>
-          <a:fontRef idx="minor">
-            <a:schemeClr val="tx1"/>
-          </a:fontRef>
-        </p:style>
-      </p:cxnSp>
-      <p:sp>
-        <p:nvSpPr>
-          <p:cNvPr id="71" name="TextBox 70"/>
-          <p:cNvSpPr txBox="1"/>
-          <p:nvPr/>
-        </p:nvSpPr>
-        <p:spPr>
-          <a:xfrm>
-            <a:off x="4922353" y="2727428"/>
-            <a:ext cx="962509" cy="307760"/>
-          </a:xfrm>
-          <a:prstGeom prst="rect">
-            <a:avLst/>
-          </a:prstGeom>
-          <a:noFill/>
-        </p:spPr>
-        <p:txBody>
-          <a:bodyPr wrap="square" lIns="91423" tIns="45712" rIns="91423" bIns="45712" rtlCol="0">
-            <a:spAutoFit/>
-          </a:bodyPr>
-          <a:lstStyle/>
-          <a:p>
-            <a:pPr algn="ctr"/>
-            <a:r>
-              <a:rPr lang="de-DE" sz="1400" dirty="0" smtClean="0">
-                <a:solidFill>
-                  <a:srgbClr val="3333FF"/>
-                </a:solidFill>
-              </a:rPr>
-              <a:t>Vd=1.2V</a:t>
-            </a:r>
-            <a:endParaRPr lang="en-GB" sz="1400" dirty="0">
-              <a:solidFill>
-                <a:srgbClr val="3333FF"/>
-              </a:solidFill>
-            </a:endParaRPr>
-          </a:p>
-        </p:txBody>
-      </p:sp>
-      <p:sp>
-        <p:nvSpPr>
-          <p:cNvPr id="72" name="TextBox 71"/>
-          <p:cNvSpPr txBox="1"/>
-          <p:nvPr/>
-        </p:nvSpPr>
-        <p:spPr>
-          <a:xfrm>
-            <a:off x="4746626" y="4032354"/>
-            <a:ext cx="1073345" cy="307760"/>
-          </a:xfrm>
-          <a:prstGeom prst="rect">
-            <a:avLst/>
-          </a:prstGeom>
-          <a:noFill/>
-        </p:spPr>
-        <p:txBody>
-          <a:bodyPr wrap="square" lIns="91423" tIns="45712" rIns="91423" bIns="45712" rtlCol="0">
-            <a:spAutoFit/>
-          </a:bodyPr>
-          <a:lstStyle/>
-          <a:p>
-            <a:pPr algn="ctr"/>
-            <a:r>
-              <a:rPr lang="de-DE" sz="1400" dirty="0" smtClean="0">
-                <a:solidFill>
-                  <a:srgbClr val="3333FF"/>
-                </a:solidFill>
-              </a:rPr>
-              <a:t>Vd=120mV</a:t>
-            </a:r>
-            <a:endParaRPr lang="en-GB" sz="1400" dirty="0">
-              <a:solidFill>
-                <a:srgbClr val="3333FF"/>
-              </a:solidFill>
-            </a:endParaRPr>
-          </a:p>
-        </p:txBody>
-      </p:sp>
-      <p:sp>
-        <p:nvSpPr>
-          <p:cNvPr id="76" name="TextBox 75"/>
-          <p:cNvSpPr txBox="1"/>
-          <p:nvPr/>
-        </p:nvSpPr>
-        <p:spPr>
-          <a:xfrm>
-            <a:off x="3974615" y="2722665"/>
-            <a:ext cx="843447" cy="307760"/>
-          </a:xfrm>
-          <a:prstGeom prst="rect">
-            <a:avLst/>
-          </a:prstGeom>
-          <a:noFill/>
-        </p:spPr>
-        <p:txBody>
-          <a:bodyPr wrap="square" lIns="91423" tIns="45712" rIns="91423" bIns="45712" rtlCol="0">
-            <a:spAutoFit/>
-          </a:bodyPr>
-          <a:lstStyle/>
-          <a:p>
-            <a:pPr algn="ctr"/>
-            <a:r>
-              <a:rPr lang="de-DE" sz="1400" dirty="0" smtClean="0">
-                <a:solidFill>
-                  <a:srgbClr val="3333FF"/>
-                </a:solidFill>
-              </a:rPr>
-              <a:t>Vi&gt;4.5V</a:t>
-            </a:r>
-            <a:endParaRPr lang="en-GB" sz="1400" dirty="0">
-              <a:solidFill>
-                <a:srgbClr val="3333FF"/>
-              </a:solidFill>
-            </a:endParaRPr>
-          </a:p>
-        </p:txBody>
-      </p:sp>
-      <p:sp>
-        <p:nvSpPr>
-          <p:cNvPr id="95" name="TextBox 94"/>
-          <p:cNvSpPr txBox="1"/>
-          <p:nvPr/>
-        </p:nvSpPr>
-        <p:spPr>
-          <a:xfrm>
-            <a:off x="1496786" y="3091543"/>
-            <a:ext cx="948602" cy="307760"/>
-          </a:xfrm>
-          <a:prstGeom prst="rect">
-            <a:avLst/>
-          </a:prstGeom>
-          <a:noFill/>
-        </p:spPr>
-        <p:txBody>
-          <a:bodyPr wrap="square" lIns="91423" tIns="45712" rIns="91423" bIns="45712" rtlCol="0">
-            <a:spAutoFit/>
-          </a:bodyPr>
-          <a:lstStyle/>
-          <a:p>
-            <a:pPr algn="ctr"/>
-            <a:r>
-              <a:rPr lang="de-DE" sz="1400" dirty="0" smtClean="0">
-                <a:solidFill>
-                  <a:srgbClr val="00B050"/>
-                </a:solidFill>
-              </a:rPr>
-              <a:t>450mA</a:t>
-            </a:r>
-            <a:endParaRPr lang="en-GB" sz="1400" dirty="0">
-              <a:solidFill>
-                <a:srgbClr val="00B050"/>
-              </a:solidFill>
-            </a:endParaRPr>
-          </a:p>
-        </p:txBody>
-      </p:sp>
-      <p:sp>
-        <p:nvSpPr>
-          <p:cNvPr id="52" name="Rectangle 51"/>
-          <p:cNvSpPr/>
-          <p:nvPr/>
-        </p:nvSpPr>
-        <p:spPr>
-          <a:xfrm>
-            <a:off x="11431856" y="8353256"/>
-            <a:ext cx="1102848" cy="856616"/>
+            <a:off x="8878960" y="4089400"/>
+            <a:ext cx="938140" cy="850900"/>
           </a:xfrm>
           <a:prstGeom prst="rect">
             <a:avLst/>
@@ -4714,145 +5170,36 @@
             <a:pPr algn="ctr"/>
             <a:r>
               <a:rPr lang="de-DE" sz="1200" dirty="0" smtClean="0"/>
-              <a:t>Memory</a:t>
+              <a:t>Jumper</a:t>
             </a:r>
           </a:p>
           <a:p>
             <a:pPr algn="ctr"/>
             <a:r>
               <a:rPr lang="de-DE" sz="1200" dirty="0" smtClean="0"/>
-              <a:t>Imax=200mA</a:t>
+              <a:t>For  USB</a:t>
+            </a:r>
+          </a:p>
+          <a:p>
+            <a:pPr algn="ctr"/>
+            <a:r>
+              <a:rPr lang="de-DE" sz="1200" dirty="0" smtClean="0"/>
+              <a:t>Program</a:t>
             </a:r>
             <a:endParaRPr lang="de-DE" sz="1200" dirty="0"/>
           </a:p>
         </p:txBody>
       </p:sp>
-      <p:cxnSp>
-        <p:nvCxnSpPr>
-          <p:cNvPr id="104" name="Straight Connector 16"/>
-          <p:cNvCxnSpPr>
-            <a:stCxn id="58" idx="0"/>
-          </p:cNvCxnSpPr>
-          <p:nvPr/>
-        </p:nvCxnSpPr>
-        <p:spPr>
-          <a:xfrm rot="16200000" flipV="1">
-            <a:off x="8240008" y="4548897"/>
-            <a:ext cx="2266428" cy="26637"/>
-          </a:xfrm>
-          <a:prstGeom prst="straightConnector1">
-            <a:avLst/>
-          </a:prstGeom>
-          <a:ln w="25400">
-            <a:solidFill>
-              <a:schemeClr val="tx1"/>
-            </a:solidFill>
-            <a:tailEnd type="oval"/>
-          </a:ln>
-        </p:spPr>
-        <p:style>
-          <a:lnRef idx="1">
-            <a:schemeClr val="accent1"/>
-          </a:lnRef>
-          <a:fillRef idx="0">
-            <a:schemeClr val="accent1"/>
-          </a:fillRef>
-          <a:effectRef idx="0">
-            <a:schemeClr val="accent1"/>
-          </a:effectRef>
-          <a:fontRef idx="minor">
-            <a:schemeClr val="tx1"/>
-          </a:fontRef>
-        </p:style>
-      </p:cxnSp>
-      <p:sp>
-        <p:nvSpPr>
-          <p:cNvPr id="108" name="TextBox 107"/>
-          <p:cNvSpPr txBox="1"/>
-          <p:nvPr/>
-        </p:nvSpPr>
-        <p:spPr>
-          <a:xfrm>
-            <a:off x="5622442" y="3492500"/>
-            <a:ext cx="1311758" cy="307760"/>
-          </a:xfrm>
-          <a:prstGeom prst="rect">
-            <a:avLst/>
-          </a:prstGeom>
-          <a:noFill/>
-        </p:spPr>
-        <p:txBody>
-          <a:bodyPr wrap="square" lIns="91423" tIns="45712" rIns="91423" bIns="45712" rtlCol="0">
-            <a:spAutoFit/>
-          </a:bodyPr>
-          <a:lstStyle/>
-          <a:p>
-            <a:pPr algn="ctr"/>
-            <a:r>
-              <a:rPr lang="de-DE" sz="1400" dirty="0" smtClean="0">
-                <a:solidFill>
-                  <a:srgbClr val="00B050"/>
-                </a:solidFill>
-              </a:rPr>
-              <a:t>1A / 450mA </a:t>
-            </a:r>
-            <a:endParaRPr lang="en-GB" sz="1400" dirty="0">
-              <a:solidFill>
-                <a:srgbClr val="00B050"/>
-              </a:solidFill>
-            </a:endParaRPr>
-          </a:p>
-        </p:txBody>
-      </p:sp>
-      <p:sp>
-        <p:nvSpPr>
-          <p:cNvPr id="111" name="TextBox 110"/>
-          <p:cNvSpPr txBox="1"/>
-          <p:nvPr/>
-        </p:nvSpPr>
-        <p:spPr>
-          <a:xfrm>
-            <a:off x="4292115" y="4589565"/>
-            <a:ext cx="843447" cy="307760"/>
-          </a:xfrm>
-          <a:prstGeom prst="rect">
-            <a:avLst/>
-          </a:prstGeom>
-          <a:noFill/>
-        </p:spPr>
-        <p:txBody>
-          <a:bodyPr wrap="square" lIns="91423" tIns="45712" rIns="91423" bIns="45712" rtlCol="0">
-            <a:spAutoFit/>
-          </a:bodyPr>
-          <a:lstStyle/>
-          <a:p>
-            <a:pPr algn="ctr"/>
-            <a:r>
-              <a:rPr lang="de-DE" sz="1400" dirty="0" smtClean="0">
-                <a:solidFill>
-                  <a:srgbClr val="3333FF"/>
-                </a:solidFill>
-              </a:rPr>
-              <a:t>Vi=5V</a:t>
-            </a:r>
-            <a:endParaRPr lang="en-GB" sz="1400" dirty="0">
-              <a:solidFill>
-                <a:srgbClr val="3333FF"/>
-              </a:solidFill>
-            </a:endParaRPr>
-          </a:p>
-        </p:txBody>
-      </p:sp>
-      <p:sp>
-        <p:nvSpPr>
-          <p:cNvPr id="96" name="Rectangle 95"/>
+      <p:sp>
+        <p:nvSpPr>
+          <p:cNvPr id="94" name="Rectangle 93"/>
           <p:cNvSpPr/>
           <p:nvPr/>
         </p:nvSpPr>
         <p:spPr>
           <a:xfrm>
-            <a:off x="10568256" y="5737056"/>
-            <a:ext cx="1102848" cy="856616"/>
+            <a:off x="9894960" y="4089400"/>
+            <a:ext cx="938140" cy="850900"/>
           </a:xfrm>
           <a:prstGeom prst="rect">
             <a:avLst/>
@@ -4881,14 +5228,21 @@
             <a:pPr algn="ctr"/>
             <a:r>
               <a:rPr lang="de-DE" sz="1200" dirty="0" smtClean="0"/>
-              <a:t>Memory</a:t>
+              <a:t>Jumper</a:t>
             </a:r>
           </a:p>
           <a:p>
             <a:pPr algn="ctr"/>
             <a:r>
               <a:rPr lang="de-DE" sz="1200" dirty="0" smtClean="0"/>
-              <a:t>Imax=200mA</a:t>
+              <a:t>For  USB</a:t>
+            </a:r>
+          </a:p>
+          <a:p>
+            <a:pPr algn="ctr"/>
+            <a:r>
+              <a:rPr lang="de-DE" sz="1200" dirty="0" smtClean="0"/>
+              <a:t>Program</a:t>
             </a:r>
             <a:endParaRPr lang="de-DE" sz="1200" dirty="0"/>
           </a:p>
@@ -4896,14 +5250,14 @@
       </p:sp>
       <p:sp>
         <p:nvSpPr>
-          <p:cNvPr id="50" name="Rectangle 49"/>
+          <p:cNvPr id="97" name="Rectangle 96"/>
           <p:cNvSpPr/>
           <p:nvPr/>
         </p:nvSpPr>
         <p:spPr>
           <a:xfrm>
-            <a:off x="11431856" y="7314228"/>
-            <a:ext cx="1102848" cy="623272"/>
+            <a:off x="11482460" y="4089400"/>
+            <a:ext cx="938140" cy="850900"/>
           </a:xfrm>
           <a:prstGeom prst="rect">
             <a:avLst/>
@@ -4932,62 +5286,30 @@
             <a:pPr algn="ctr"/>
             <a:r>
               <a:rPr lang="de-DE" sz="1200" dirty="0" smtClean="0"/>
-              <a:t>Buffer</a:t>
-            </a:r>
-          </a:p>
-          <a:p>
-            <a:pPr algn="ctr"/>
-            <a:r>
-              <a:rPr lang="en-GB" sz="1200" dirty="0" smtClean="0"/>
-              <a:t>SN74LVC125A</a:t>
+              <a:t>Jumper</a:t>
+            </a:r>
+          </a:p>
+          <a:p>
+            <a:pPr algn="ctr"/>
+            <a:r>
+              <a:rPr lang="de-DE" sz="1200" dirty="0" smtClean="0"/>
+              <a:t>For  USB</a:t>
+            </a:r>
+          </a:p>
+          <a:p>
+            <a:pPr algn="ctr"/>
+            <a:r>
+              <a:rPr lang="de-DE" sz="1200" dirty="0" smtClean="0"/>
+              <a:t>Program</a:t>
             </a:r>
             <a:endParaRPr lang="de-DE" sz="1200" dirty="0"/>
-          </a:p>
-        </p:txBody>
-      </p:sp>
-      <p:sp>
-        <p:nvSpPr>
-          <p:cNvPr id="36" name="TextBox 35"/>
-          <p:cNvSpPr txBox="1"/>
-          <p:nvPr/>
-        </p:nvSpPr>
-        <p:spPr>
-          <a:xfrm>
-            <a:off x="11884042" y="6959600"/>
-            <a:ext cx="866758" cy="307760"/>
-          </a:xfrm>
-          <a:prstGeom prst="rect">
-            <a:avLst/>
-          </a:prstGeom>
-          <a:noFill/>
-        </p:spPr>
-        <p:txBody>
-          <a:bodyPr wrap="square" lIns="91423" tIns="45712" rIns="91423" bIns="45712" rtlCol="0">
-            <a:spAutoFit/>
-          </a:bodyPr>
-          <a:lstStyle/>
-          <a:p>
-            <a:pPr algn="ctr"/>
-            <a:r>
-              <a:rPr lang="de-DE" sz="1400" dirty="0" smtClean="0">
-                <a:solidFill>
-                  <a:srgbClr val="FF0000"/>
-                </a:solidFill>
-              </a:rPr>
-              <a:t>660mW</a:t>
-            </a:r>
-            <a:endParaRPr lang="en-GB" sz="1400" dirty="0">
-              <a:solidFill>
-                <a:srgbClr val="FF0000"/>
-              </a:solidFill>
-            </a:endParaRPr>
           </a:p>
         </p:txBody>
       </p:sp>
     </p:spTree>
     <p:extLst>
       <p:ext uri="{BB962C8B-B14F-4D97-AF65-F5344CB8AC3E}">
-        <p14:creationId xmlns:p14="http://schemas.microsoft.com/office/powerpoint/2010/main" xmlns="" val="501831016"/>
+        <p14:creationId xmlns="" xmlns:p14="http://schemas.microsoft.com/office/powerpoint/2010/main" val="501831016"/>
       </p:ext>
     </p:extLst>
   </p:cSld>
@@ -6969,7 +7291,7 @@
     </p:spTree>
     <p:extLst>
       <p:ext uri="{BB962C8B-B14F-4D97-AF65-F5344CB8AC3E}">
-        <p14:creationId xmlns:p14="http://schemas.microsoft.com/office/powerpoint/2010/main" xmlns="" val="501831016"/>
+        <p14:creationId xmlns="" xmlns:p14="http://schemas.microsoft.com/office/powerpoint/2010/main" val="501831016"/>
       </p:ext>
     </p:extLst>
   </p:cSld>
@@ -7241,7 +7563,7 @@
   <a:extraClrSchemeLst/>
   <a:extLst>
     <a:ext uri="{05A4C25C-085E-4340-85A3-A5531E510DB2}">
-      <thm15:themeFamily xmlns:thm15="http://schemas.microsoft.com/office/thememl/2012/main" xmlns="" name="Office Theme" id="{62F939B6-93AF-4DB8-9C6B-D6C7DFDC589F}" vid="{4A3C46E8-61CC-4603-A589-7422A47A8E4A}"/>
+      <thm15:themeFamily xmlns="" xmlns:thm15="http://schemas.microsoft.com/office/thememl/2012/main" name="Office Theme" id="{62F939B6-93AF-4DB8-9C6B-D6C7DFDC589F}" vid="{4A3C46E8-61CC-4603-A589-7422A47A8E4A}"/>
     </a:ext>
   </a:extLst>
 </a:theme>

</xml_diff>

<commit_message>
feat: add datasheet of oscillator and update pinout table
</commit_message>
<xml_diff>
--- a/Projects/CameraSystem/Docs/Block_Diagram.pptx
+++ b/Projects/CameraSystem/Docs/Block_Diagram.pptx
@@ -105,6 +105,22 @@
       </a:defRPr>
     </a:lvl9pPr>
   </p:defaultTextStyle>
+  <p:extLst>
+    <p:ext uri="{EFAFB233-063F-42B5-8137-9DF3F51BA10A}">
+      <p15:sldGuideLst xmlns:p15="http://schemas.microsoft.com/office/powerpoint/2012/main">
+        <p15:guide id="1" orient="horz" pos="3024">
+          <p15:clr>
+            <a:srgbClr val="A4A3A4"/>
+          </p15:clr>
+        </p15:guide>
+        <p15:guide id="2" pos="4032">
+          <p15:clr>
+            <a:srgbClr val="A4A3A4"/>
+          </p15:clr>
+        </p15:guide>
+      </p15:sldGuideLst>
+    </p:ext>
+  </p:extLst>
 </p:presentation>
 </file>
 
@@ -240,7 +256,7 @@
             <a:fld id="{B1816B0C-7247-44DD-BCB7-DAF5E546C78B}" type="datetimeFigureOut">
               <a:rPr lang="de-DE" smtClean="0"/>
               <a:pPr/>
-              <a:t>03.10.2018</a:t>
+              <a:t>04.10.2018</a:t>
             </a:fld>
             <a:endParaRPr lang="de-DE"/>
           </a:p>
@@ -283,7 +299,7 @@
             <a:fld id="{4DE28FB9-0510-47D8-A3D4-85FD7A605EA3}" type="slidenum">
               <a:rPr lang="de-DE" smtClean="0"/>
               <a:pPr/>
-              <a:t>‹#›</a:t>
+              <a:t>‹Nr.›</a:t>
             </a:fld>
             <a:endParaRPr lang="de-DE"/>
           </a:p>
@@ -292,7 +308,7 @@
     </p:spTree>
     <p:extLst>
       <p:ext uri="{BB962C8B-B14F-4D97-AF65-F5344CB8AC3E}">
-        <p14:creationId xmlns="" xmlns:p14="http://schemas.microsoft.com/office/powerpoint/2010/main" val="4183135021"/>
+        <p14:creationId xmlns:p14="http://schemas.microsoft.com/office/powerpoint/2010/main" val="4183135021"/>
       </p:ext>
     </p:extLst>
   </p:cSld>
@@ -412,7 +428,7 @@
             <a:fld id="{B1816B0C-7247-44DD-BCB7-DAF5E546C78B}" type="datetimeFigureOut">
               <a:rPr lang="de-DE" smtClean="0"/>
               <a:pPr/>
-              <a:t>03.10.2018</a:t>
+              <a:t>04.10.2018</a:t>
             </a:fld>
             <a:endParaRPr lang="de-DE"/>
           </a:p>
@@ -455,7 +471,7 @@
             <a:fld id="{4DE28FB9-0510-47D8-A3D4-85FD7A605EA3}" type="slidenum">
               <a:rPr lang="de-DE" smtClean="0"/>
               <a:pPr/>
-              <a:t>‹#›</a:t>
+              <a:t>‹Nr.›</a:t>
             </a:fld>
             <a:endParaRPr lang="de-DE"/>
           </a:p>
@@ -464,7 +480,7 @@
     </p:spTree>
     <p:extLst>
       <p:ext uri="{BB962C8B-B14F-4D97-AF65-F5344CB8AC3E}">
-        <p14:creationId xmlns="" xmlns:p14="http://schemas.microsoft.com/office/powerpoint/2010/main" val="634728941"/>
+        <p14:creationId xmlns:p14="http://schemas.microsoft.com/office/powerpoint/2010/main" val="634728941"/>
       </p:ext>
     </p:extLst>
   </p:cSld>
@@ -594,7 +610,7 @@
             <a:fld id="{B1816B0C-7247-44DD-BCB7-DAF5E546C78B}" type="datetimeFigureOut">
               <a:rPr lang="de-DE" smtClean="0"/>
               <a:pPr/>
-              <a:t>03.10.2018</a:t>
+              <a:t>04.10.2018</a:t>
             </a:fld>
             <a:endParaRPr lang="de-DE"/>
           </a:p>
@@ -637,7 +653,7 @@
             <a:fld id="{4DE28FB9-0510-47D8-A3D4-85FD7A605EA3}" type="slidenum">
               <a:rPr lang="de-DE" smtClean="0"/>
               <a:pPr/>
-              <a:t>‹#›</a:t>
+              <a:t>‹Nr.›</a:t>
             </a:fld>
             <a:endParaRPr lang="de-DE"/>
           </a:p>
@@ -646,7 +662,7 @@
     </p:spTree>
     <p:extLst>
       <p:ext uri="{BB962C8B-B14F-4D97-AF65-F5344CB8AC3E}">
-        <p14:creationId xmlns="" xmlns:p14="http://schemas.microsoft.com/office/powerpoint/2010/main" val="2163732138"/>
+        <p14:creationId xmlns:p14="http://schemas.microsoft.com/office/powerpoint/2010/main" val="2163732138"/>
       </p:ext>
     </p:extLst>
   </p:cSld>
@@ -766,7 +782,7 @@
             <a:fld id="{B1816B0C-7247-44DD-BCB7-DAF5E546C78B}" type="datetimeFigureOut">
               <a:rPr lang="de-DE" smtClean="0"/>
               <a:pPr/>
-              <a:t>03.10.2018</a:t>
+              <a:t>04.10.2018</a:t>
             </a:fld>
             <a:endParaRPr lang="de-DE"/>
           </a:p>
@@ -809,7 +825,7 @@
             <a:fld id="{4DE28FB9-0510-47D8-A3D4-85FD7A605EA3}" type="slidenum">
               <a:rPr lang="de-DE" smtClean="0"/>
               <a:pPr/>
-              <a:t>‹#›</a:t>
+              <a:t>‹Nr.›</a:t>
             </a:fld>
             <a:endParaRPr lang="de-DE"/>
           </a:p>
@@ -818,7 +834,7 @@
     </p:spTree>
     <p:extLst>
       <p:ext uri="{BB962C8B-B14F-4D97-AF65-F5344CB8AC3E}">
-        <p14:creationId xmlns="" xmlns:p14="http://schemas.microsoft.com/office/powerpoint/2010/main" val="815330753"/>
+        <p14:creationId xmlns:p14="http://schemas.microsoft.com/office/powerpoint/2010/main" val="815330753"/>
       </p:ext>
     </p:extLst>
   </p:cSld>
@@ -1012,7 +1028,7 @@
             <a:fld id="{B1816B0C-7247-44DD-BCB7-DAF5E546C78B}" type="datetimeFigureOut">
               <a:rPr lang="de-DE" smtClean="0"/>
               <a:pPr/>
-              <a:t>03.10.2018</a:t>
+              <a:t>04.10.2018</a:t>
             </a:fld>
             <a:endParaRPr lang="de-DE"/>
           </a:p>
@@ -1055,7 +1071,7 @@
             <a:fld id="{4DE28FB9-0510-47D8-A3D4-85FD7A605EA3}" type="slidenum">
               <a:rPr lang="de-DE" smtClean="0"/>
               <a:pPr/>
-              <a:t>‹#›</a:t>
+              <a:t>‹Nr.›</a:t>
             </a:fld>
             <a:endParaRPr lang="de-DE"/>
           </a:p>
@@ -1064,7 +1080,7 @@
     </p:spTree>
     <p:extLst>
       <p:ext uri="{BB962C8B-B14F-4D97-AF65-F5344CB8AC3E}">
-        <p14:creationId xmlns="" xmlns:p14="http://schemas.microsoft.com/office/powerpoint/2010/main" val="2365557286"/>
+        <p14:creationId xmlns:p14="http://schemas.microsoft.com/office/powerpoint/2010/main" val="2365557286"/>
       </p:ext>
     </p:extLst>
   </p:cSld>
@@ -1246,7 +1262,7 @@
             <a:fld id="{B1816B0C-7247-44DD-BCB7-DAF5E546C78B}" type="datetimeFigureOut">
               <a:rPr lang="de-DE" smtClean="0"/>
               <a:pPr/>
-              <a:t>03.10.2018</a:t>
+              <a:t>04.10.2018</a:t>
             </a:fld>
             <a:endParaRPr lang="de-DE"/>
           </a:p>
@@ -1289,7 +1305,7 @@
             <a:fld id="{4DE28FB9-0510-47D8-A3D4-85FD7A605EA3}" type="slidenum">
               <a:rPr lang="de-DE" smtClean="0"/>
               <a:pPr/>
-              <a:t>‹#›</a:t>
+              <a:t>‹Nr.›</a:t>
             </a:fld>
             <a:endParaRPr lang="de-DE"/>
           </a:p>
@@ -1298,7 +1314,7 @@
     </p:spTree>
     <p:extLst>
       <p:ext uri="{BB962C8B-B14F-4D97-AF65-F5344CB8AC3E}">
-        <p14:creationId xmlns="" xmlns:p14="http://schemas.microsoft.com/office/powerpoint/2010/main" val="1503624474"/>
+        <p14:creationId xmlns:p14="http://schemas.microsoft.com/office/powerpoint/2010/main" val="1503624474"/>
       </p:ext>
     </p:extLst>
   </p:cSld>
@@ -1615,7 +1631,7 @@
             <a:fld id="{B1816B0C-7247-44DD-BCB7-DAF5E546C78B}" type="datetimeFigureOut">
               <a:rPr lang="de-DE" smtClean="0"/>
               <a:pPr/>
-              <a:t>03.10.2018</a:t>
+              <a:t>04.10.2018</a:t>
             </a:fld>
             <a:endParaRPr lang="de-DE"/>
           </a:p>
@@ -1658,7 +1674,7 @@
             <a:fld id="{4DE28FB9-0510-47D8-A3D4-85FD7A605EA3}" type="slidenum">
               <a:rPr lang="de-DE" smtClean="0"/>
               <a:pPr/>
-              <a:t>‹#›</a:t>
+              <a:t>‹Nr.›</a:t>
             </a:fld>
             <a:endParaRPr lang="de-DE"/>
           </a:p>
@@ -1667,7 +1683,7 @@
     </p:spTree>
     <p:extLst>
       <p:ext uri="{BB962C8B-B14F-4D97-AF65-F5344CB8AC3E}">
-        <p14:creationId xmlns="" xmlns:p14="http://schemas.microsoft.com/office/powerpoint/2010/main" val="3505896177"/>
+        <p14:creationId xmlns:p14="http://schemas.microsoft.com/office/powerpoint/2010/main" val="3505896177"/>
       </p:ext>
     </p:extLst>
   </p:cSld>
@@ -1735,7 +1751,7 @@
             <a:fld id="{B1816B0C-7247-44DD-BCB7-DAF5E546C78B}" type="datetimeFigureOut">
               <a:rPr lang="de-DE" smtClean="0"/>
               <a:pPr/>
-              <a:t>03.10.2018</a:t>
+              <a:t>04.10.2018</a:t>
             </a:fld>
             <a:endParaRPr lang="de-DE"/>
           </a:p>
@@ -1778,7 +1794,7 @@
             <a:fld id="{4DE28FB9-0510-47D8-A3D4-85FD7A605EA3}" type="slidenum">
               <a:rPr lang="de-DE" smtClean="0"/>
               <a:pPr/>
-              <a:t>‹#›</a:t>
+              <a:t>‹Nr.›</a:t>
             </a:fld>
             <a:endParaRPr lang="de-DE"/>
           </a:p>
@@ -1787,7 +1803,7 @@
     </p:spTree>
     <p:extLst>
       <p:ext uri="{BB962C8B-B14F-4D97-AF65-F5344CB8AC3E}">
-        <p14:creationId xmlns="" xmlns:p14="http://schemas.microsoft.com/office/powerpoint/2010/main" val="704671550"/>
+        <p14:creationId xmlns:p14="http://schemas.microsoft.com/office/powerpoint/2010/main" val="704671550"/>
       </p:ext>
     </p:extLst>
   </p:cSld>
@@ -1832,7 +1848,7 @@
             <a:fld id="{B1816B0C-7247-44DD-BCB7-DAF5E546C78B}" type="datetimeFigureOut">
               <a:rPr lang="de-DE" smtClean="0"/>
               <a:pPr/>
-              <a:t>03.10.2018</a:t>
+              <a:t>04.10.2018</a:t>
             </a:fld>
             <a:endParaRPr lang="de-DE"/>
           </a:p>
@@ -1875,7 +1891,7 @@
             <a:fld id="{4DE28FB9-0510-47D8-A3D4-85FD7A605EA3}" type="slidenum">
               <a:rPr lang="de-DE" smtClean="0"/>
               <a:pPr/>
-              <a:t>‹#›</a:t>
+              <a:t>‹Nr.›</a:t>
             </a:fld>
             <a:endParaRPr lang="de-DE"/>
           </a:p>
@@ -1884,7 +1900,7 @@
     </p:spTree>
     <p:extLst>
       <p:ext uri="{BB962C8B-B14F-4D97-AF65-F5344CB8AC3E}">
-        <p14:creationId xmlns="" xmlns:p14="http://schemas.microsoft.com/office/powerpoint/2010/main" val="449122657"/>
+        <p14:creationId xmlns:p14="http://schemas.microsoft.com/office/powerpoint/2010/main" val="449122657"/>
       </p:ext>
     </p:extLst>
   </p:cSld>
@@ -2111,7 +2127,7 @@
             <a:fld id="{B1816B0C-7247-44DD-BCB7-DAF5E546C78B}" type="datetimeFigureOut">
               <a:rPr lang="de-DE" smtClean="0"/>
               <a:pPr/>
-              <a:t>03.10.2018</a:t>
+              <a:t>04.10.2018</a:t>
             </a:fld>
             <a:endParaRPr lang="de-DE"/>
           </a:p>
@@ -2154,7 +2170,7 @@
             <a:fld id="{4DE28FB9-0510-47D8-A3D4-85FD7A605EA3}" type="slidenum">
               <a:rPr lang="de-DE" smtClean="0"/>
               <a:pPr/>
-              <a:t>‹#›</a:t>
+              <a:t>‹Nr.›</a:t>
             </a:fld>
             <a:endParaRPr lang="de-DE"/>
           </a:p>
@@ -2163,7 +2179,7 @@
     </p:spTree>
     <p:extLst>
       <p:ext uri="{BB962C8B-B14F-4D97-AF65-F5344CB8AC3E}">
-        <p14:creationId xmlns="" xmlns:p14="http://schemas.microsoft.com/office/powerpoint/2010/main" val="2525634023"/>
+        <p14:creationId xmlns:p14="http://schemas.microsoft.com/office/powerpoint/2010/main" val="2525634023"/>
       </p:ext>
     </p:extLst>
   </p:cSld>
@@ -2370,7 +2386,7 @@
             <a:fld id="{B1816B0C-7247-44DD-BCB7-DAF5E546C78B}" type="datetimeFigureOut">
               <a:rPr lang="de-DE" smtClean="0"/>
               <a:pPr/>
-              <a:t>03.10.2018</a:t>
+              <a:t>04.10.2018</a:t>
             </a:fld>
             <a:endParaRPr lang="de-DE"/>
           </a:p>
@@ -2413,7 +2429,7 @@
             <a:fld id="{4DE28FB9-0510-47D8-A3D4-85FD7A605EA3}" type="slidenum">
               <a:rPr lang="de-DE" smtClean="0"/>
               <a:pPr/>
-              <a:t>‹#›</a:t>
+              <a:t>‹Nr.›</a:t>
             </a:fld>
             <a:endParaRPr lang="de-DE"/>
           </a:p>
@@ -2422,7 +2438,7 @@
     </p:spTree>
     <p:extLst>
       <p:ext uri="{BB962C8B-B14F-4D97-AF65-F5344CB8AC3E}">
-        <p14:creationId xmlns="" xmlns:p14="http://schemas.microsoft.com/office/powerpoint/2010/main" val="2050898295"/>
+        <p14:creationId xmlns:p14="http://schemas.microsoft.com/office/powerpoint/2010/main" val="2050898295"/>
       </p:ext>
     </p:extLst>
   </p:cSld>
@@ -2585,7 +2601,7 @@
             <a:fld id="{B1816B0C-7247-44DD-BCB7-DAF5E546C78B}" type="datetimeFigureOut">
               <a:rPr lang="de-DE" smtClean="0"/>
               <a:pPr/>
-              <a:t>03.10.2018</a:t>
+              <a:t>04.10.2018</a:t>
             </a:fld>
             <a:endParaRPr lang="de-DE"/>
           </a:p>
@@ -2664,7 +2680,7 @@
             <a:fld id="{4DE28FB9-0510-47D8-A3D4-85FD7A605EA3}" type="slidenum">
               <a:rPr lang="de-DE" smtClean="0"/>
               <a:pPr/>
-              <a:t>‹#›</a:t>
+              <a:t>‹Nr.›</a:t>
             </a:fld>
             <a:endParaRPr lang="de-DE"/>
           </a:p>
@@ -2673,7 +2689,7 @@
     </p:spTree>
     <p:extLst>
       <p:ext uri="{BB962C8B-B14F-4D97-AF65-F5344CB8AC3E}">
-        <p14:creationId xmlns="" xmlns:p14="http://schemas.microsoft.com/office/powerpoint/2010/main" val="872436980"/>
+        <p14:creationId xmlns:p14="http://schemas.microsoft.com/office/powerpoint/2010/main" val="872436980"/>
       </p:ext>
     </p:extLst>
   </p:cSld>
@@ -5076,14 +5092,14 @@
       </p:cxnSp>
       <p:sp>
         <p:nvSpPr>
-          <p:cNvPr id="91" name="Rectangle 90"/>
+          <p:cNvPr id="93" name="Rectangle 92"/>
           <p:cNvSpPr/>
           <p:nvPr/>
         </p:nvSpPr>
         <p:spPr>
           <a:xfrm>
-            <a:off x="448174" y="7451533"/>
-            <a:ext cx="1007190" cy="782315"/>
+            <a:off x="8878960" y="4089400"/>
+            <a:ext cx="938140" cy="850900"/>
           </a:xfrm>
           <a:prstGeom prst="rect">
             <a:avLst/>
@@ -5111,36 +5127,36 @@
           <a:p>
             <a:pPr algn="ctr"/>
             <a:r>
-              <a:rPr lang="en-GB" sz="1400" dirty="0" smtClean="0"/>
-              <a:t>PCA9306</a:t>
-            </a:r>
-          </a:p>
-          <a:p>
-            <a:pPr algn="ctr"/>
-            <a:r>
-              <a:rPr lang="de-DE" sz="1400" dirty="0" smtClean="0"/>
-              <a:t>Level</a:t>
-            </a:r>
-          </a:p>
-          <a:p>
-            <a:pPr algn="ctr"/>
-            <a:r>
-              <a:rPr lang="de-DE" sz="1400" dirty="0" smtClean="0"/>
-              <a:t>Shifter</a:t>
-            </a:r>
-            <a:endParaRPr lang="de-DE" sz="1400" dirty="0"/>
-          </a:p>
-        </p:txBody>
-      </p:sp>
-      <p:sp>
-        <p:nvSpPr>
-          <p:cNvPr id="93" name="Rectangle 92"/>
+              <a:rPr lang="de-DE" sz="1200" dirty="0" smtClean="0"/>
+              <a:t>Jumper</a:t>
+            </a:r>
+          </a:p>
+          <a:p>
+            <a:pPr algn="ctr"/>
+            <a:r>
+              <a:rPr lang="de-DE" sz="1200" dirty="0" smtClean="0"/>
+              <a:t>For  USB</a:t>
+            </a:r>
+          </a:p>
+          <a:p>
+            <a:pPr algn="ctr"/>
+            <a:r>
+              <a:rPr lang="de-DE" sz="1200" dirty="0" smtClean="0"/>
+              <a:t>Program</a:t>
+            </a:r>
+            <a:endParaRPr lang="de-DE" sz="1200" dirty="0"/>
+          </a:p>
+        </p:txBody>
+      </p:sp>
+      <p:sp>
+        <p:nvSpPr>
+          <p:cNvPr id="94" name="Rectangle 93"/>
           <p:cNvSpPr/>
           <p:nvPr/>
         </p:nvSpPr>
         <p:spPr>
           <a:xfrm>
-            <a:off x="8878960" y="4089400"/>
+            <a:off x="9894960" y="4089400"/>
             <a:ext cx="938140" cy="850900"/>
           </a:xfrm>
           <a:prstGeom prst="rect">
@@ -5192,13 +5208,13 @@
       </p:sp>
       <p:sp>
         <p:nvSpPr>
-          <p:cNvPr id="94" name="Rectangle 93"/>
+          <p:cNvPr id="97" name="Rectangle 96"/>
           <p:cNvSpPr/>
           <p:nvPr/>
         </p:nvSpPr>
         <p:spPr>
           <a:xfrm>
-            <a:off x="9894960" y="4089400"/>
+            <a:off x="11482460" y="4089400"/>
             <a:ext cx="938140" cy="850900"/>
           </a:xfrm>
           <a:prstGeom prst="rect">
@@ -5248,68 +5264,10 @@
           </a:p>
         </p:txBody>
       </p:sp>
-      <p:sp>
-        <p:nvSpPr>
-          <p:cNvPr id="97" name="Rectangle 96"/>
-          <p:cNvSpPr/>
-          <p:nvPr/>
-        </p:nvSpPr>
-        <p:spPr>
-          <a:xfrm>
-            <a:off x="11482460" y="4089400"/>
-            <a:ext cx="938140" cy="850900"/>
-          </a:xfrm>
-          <a:prstGeom prst="rect">
-            <a:avLst/>
-          </a:prstGeom>
-        </p:spPr>
-        <p:style>
-          <a:lnRef idx="2">
-            <a:schemeClr val="accent1">
-              <a:shade val="50000"/>
-            </a:schemeClr>
-          </a:lnRef>
-          <a:fillRef idx="1">
-            <a:schemeClr val="accent1"/>
-          </a:fillRef>
-          <a:effectRef idx="0">
-            <a:schemeClr val="accent1"/>
-          </a:effectRef>
-          <a:fontRef idx="minor">
-            <a:schemeClr val="lt1"/>
-          </a:fontRef>
-        </p:style>
-        <p:txBody>
-          <a:bodyPr lIns="91423" tIns="45712" rIns="91423" bIns="45712" rtlCol="0" anchor="ctr"/>
-          <a:lstStyle/>
-          <a:p>
-            <a:pPr algn="ctr"/>
-            <a:r>
-              <a:rPr lang="de-DE" sz="1200" dirty="0" smtClean="0"/>
-              <a:t>Jumper</a:t>
-            </a:r>
-          </a:p>
-          <a:p>
-            <a:pPr algn="ctr"/>
-            <a:r>
-              <a:rPr lang="de-DE" sz="1200" dirty="0" smtClean="0"/>
-              <a:t>For  USB</a:t>
-            </a:r>
-          </a:p>
-          <a:p>
-            <a:pPr algn="ctr"/>
-            <a:r>
-              <a:rPr lang="de-DE" sz="1200" dirty="0" smtClean="0"/>
-              <a:t>Program</a:t>
-            </a:r>
-            <a:endParaRPr lang="de-DE" sz="1200" dirty="0"/>
-          </a:p>
-        </p:txBody>
-      </p:sp>
     </p:spTree>
     <p:extLst>
       <p:ext uri="{BB962C8B-B14F-4D97-AF65-F5344CB8AC3E}">
-        <p14:creationId xmlns="" xmlns:p14="http://schemas.microsoft.com/office/powerpoint/2010/main" val="501831016"/>
+        <p14:creationId xmlns:p14="http://schemas.microsoft.com/office/powerpoint/2010/main" val="501831016"/>
       </p:ext>
     </p:extLst>
   </p:cSld>
@@ -7291,7 +7249,7 @@
     </p:spTree>
     <p:extLst>
       <p:ext uri="{BB962C8B-B14F-4D97-AF65-F5344CB8AC3E}">
-        <p14:creationId xmlns="" xmlns:p14="http://schemas.microsoft.com/office/powerpoint/2010/main" val="501831016"/>
+        <p14:creationId xmlns:p14="http://schemas.microsoft.com/office/powerpoint/2010/main" val="501831016"/>
       </p:ext>
     </p:extLst>
   </p:cSld>
@@ -7563,7 +7521,7 @@
   <a:extraClrSchemeLst/>
   <a:extLst>
     <a:ext uri="{05A4C25C-085E-4340-85A3-A5531E510DB2}">
-      <thm15:themeFamily xmlns="" xmlns:thm15="http://schemas.microsoft.com/office/thememl/2012/main" name="Office Theme" id="{62F939B6-93AF-4DB8-9C6B-D6C7DFDC589F}" vid="{4A3C46E8-61CC-4603-A589-7422A47A8E4A}"/>
+      <thm15:themeFamily xmlns:thm15="http://schemas.microsoft.com/office/thememl/2012/main" name="Office Theme" id="{62F939B6-93AF-4DB8-9C6B-D6C7DFDC589F}" vid="{4A3C46E8-61CC-4603-A589-7422A47A8E4A}"/>
     </a:ext>
   </a:extLst>
 </a:theme>

</xml_diff>